<commit_message>
fix logos and master slides
</commit_message>
<xml_diff>
--- a/assets/lectures/cshl/2019/full/RNASeq_Module0_IntrotoRNA.pptx
+++ b/assets/lectures/cshl/2019/full/RNASeq_Module0_IntrotoRNA.pptx
@@ -287,7 +287,7 @@
               <a:pPr>
                 <a:defRPr/>
               </a:pPr>
-              <a:t>11/5/19</a:t>
+              <a:t>11/10/19</a:t>
             </a:fld>
             <a:endParaRPr lang="en-US"/>
           </a:p>
@@ -494,7 +494,7 @@
               <a:pPr>
                 <a:defRPr/>
               </a:pPr>
-              <a:t>11/5/19</a:t>
+              <a:t>11/10/19</a:t>
             </a:fld>
             <a:endParaRPr lang="en-US"/>
           </a:p>
@@ -861,14 +861,14 @@
           </a:ln>
           <a:extLst>
             <a:ext uri="{909E8E84-426E-40dd-AFC4-6F175D3DCCD1}">
-              <a14:hiddenFill xmlns="" xmlns:a14="http://schemas.microsoft.com/office/drawing/2010/main">
+              <a14:hiddenFill xmlns:a14="http://schemas.microsoft.com/office/drawing/2010/main" xmlns="">
                 <a:solidFill>
                   <a:srgbClr val="FFFFFF"/>
                 </a:solidFill>
               </a14:hiddenFill>
             </a:ext>
             <a:ext uri="{FAA26D3D-D897-4be2-8F04-BA451C77F1D7}">
-              <ma14:placeholderFlag xmlns="" xmlns:ma14="http://schemas.microsoft.com/office/mac/drawingml/2011/main" val="1"/>
+              <ma14:placeholderFlag xmlns:ma14="http://schemas.microsoft.com/office/mac/drawingml/2011/main" xmlns="" val="1"/>
             </a:ext>
           </a:extLst>
         </p:spPr>
@@ -887,14 +887,14 @@
           <a:noFill/>
           <a:extLst>
             <a:ext uri="{909E8E84-426E-40dd-AFC4-6F175D3DCCD1}">
-              <a14:hiddenFill xmlns="" xmlns:a14="http://schemas.microsoft.com/office/drawing/2010/main">
+              <a14:hiddenFill xmlns:a14="http://schemas.microsoft.com/office/drawing/2010/main" xmlns="">
                 <a:solidFill>
                   <a:srgbClr val="FFFFFF"/>
                 </a:solidFill>
               </a14:hiddenFill>
             </a:ext>
             <a:ext uri="{91240B29-F687-4f45-9708-019B960494DF}">
-              <a14:hiddenLine xmlns="" xmlns:a14="http://schemas.microsoft.com/office/drawing/2010/main" w="9525">
+              <a14:hiddenLine xmlns:a14="http://schemas.microsoft.com/office/drawing/2010/main" xmlns="" w="9525">
                 <a:solidFill>
                   <a:srgbClr val="000000"/>
                 </a:solidFill>
@@ -904,7 +904,7 @@
               </a14:hiddenLine>
             </a:ext>
             <a:ext uri="{FAA26D3D-D897-4be2-8F04-BA451C77F1D7}">
-              <ma14:placeholderFlag xmlns="" xmlns:ma14="http://schemas.microsoft.com/office/mac/drawingml/2011/main" val="1"/>
+              <ma14:placeholderFlag xmlns:ma14="http://schemas.microsoft.com/office/mac/drawingml/2011/main" xmlns="" val="1"/>
             </a:ext>
           </a:extLst>
         </p:spPr>
@@ -938,14 +938,14 @@
           <a:noFill/>
           <a:extLst>
             <a:ext uri="{909E8E84-426E-40dd-AFC4-6F175D3DCCD1}">
-              <a14:hiddenFill xmlns="" xmlns:a14="http://schemas.microsoft.com/office/drawing/2010/main">
+              <a14:hiddenFill xmlns:a14="http://schemas.microsoft.com/office/drawing/2010/main" xmlns="">
                 <a:solidFill>
                   <a:srgbClr val="FFFFFF"/>
                 </a:solidFill>
               </a14:hiddenFill>
             </a:ext>
             <a:ext uri="{91240B29-F687-4f45-9708-019B960494DF}">
-              <a14:hiddenLine xmlns="" xmlns:a14="http://schemas.microsoft.com/office/drawing/2010/main" w="9525">
+              <a14:hiddenLine xmlns:a14="http://schemas.microsoft.com/office/drawing/2010/main" xmlns="" w="9525">
                 <a:solidFill>
                   <a:srgbClr val="000000"/>
                 </a:solidFill>
@@ -1120,14 +1120,14 @@
           <a:noFill/>
           <a:extLst>
             <a:ext uri="{909E8E84-426E-40dd-AFC4-6F175D3DCCD1}">
-              <a14:hiddenFill xmlns="" xmlns:a14="http://schemas.microsoft.com/office/drawing/2010/main">
+              <a14:hiddenFill xmlns:a14="http://schemas.microsoft.com/office/drawing/2010/main" xmlns="">
                 <a:solidFill>
                   <a:srgbClr val="FFFFFF"/>
                 </a:solidFill>
               </a14:hiddenFill>
             </a:ext>
             <a:ext uri="{91240B29-F687-4f45-9708-019B960494DF}">
-              <a14:hiddenLine xmlns="" xmlns:a14="http://schemas.microsoft.com/office/drawing/2010/main" w="9525">
+              <a14:hiddenLine xmlns:a14="http://schemas.microsoft.com/office/drawing/2010/main" xmlns="" w="9525">
                 <a:solidFill>
                   <a:srgbClr val="000000"/>
                 </a:solidFill>
@@ -1287,7 +1287,7 @@
           </a:ln>
           <a:extLst>
             <a:ext uri="{FAA26D3D-D897-4be2-8F04-BA451C77F1D7}">
-              <ma14:placeholderFlag xmlns="" xmlns:ma14="http://schemas.microsoft.com/office/mac/drawingml/2011/main" val="1"/>
+              <ma14:placeholderFlag xmlns:ma14="http://schemas.microsoft.com/office/mac/drawingml/2011/main" xmlns="" val="1"/>
             </a:ext>
           </a:extLst>
         </p:spPr>
@@ -1316,7 +1316,7 @@
           </a:ln>
           <a:extLst>
             <a:ext uri="{FAA26D3D-D897-4be2-8F04-BA451C77F1D7}">
-              <ma14:placeholderFlag xmlns="" xmlns:ma14="http://schemas.microsoft.com/office/mac/drawingml/2011/main" val="1"/>
+              <ma14:placeholderFlag xmlns:ma14="http://schemas.microsoft.com/office/mac/drawingml/2011/main" xmlns="" val="1"/>
             </a:ext>
           </a:extLst>
         </p:spPr>
@@ -1376,14 +1376,14 @@
           <a:noFill/>
           <a:extLst>
             <a:ext uri="{909E8E84-426E-40dd-AFC4-6F175D3DCCD1}">
-              <a14:hiddenFill xmlns="" xmlns:a14="http://schemas.microsoft.com/office/drawing/2010/main">
+              <a14:hiddenFill xmlns:a14="http://schemas.microsoft.com/office/drawing/2010/main" xmlns="">
                 <a:solidFill>
                   <a:srgbClr val="FFFFFF"/>
                 </a:solidFill>
               </a14:hiddenFill>
             </a:ext>
             <a:ext uri="{91240B29-F687-4f45-9708-019B960494DF}">
-              <a14:hiddenLine xmlns="" xmlns:a14="http://schemas.microsoft.com/office/drawing/2010/main" w="9525">
+              <a14:hiddenLine xmlns:a14="http://schemas.microsoft.com/office/drawing/2010/main" xmlns="" w="9525">
                 <a:solidFill>
                   <a:srgbClr val="000000"/>
                 </a:solidFill>
@@ -1543,7 +1543,7 @@
           </a:ln>
           <a:extLst>
             <a:ext uri="{FAA26D3D-D897-4be2-8F04-BA451C77F1D7}">
-              <ma14:placeholderFlag xmlns="" xmlns:ma14="http://schemas.microsoft.com/office/mac/drawingml/2011/main" val="1"/>
+              <ma14:placeholderFlag xmlns:ma14="http://schemas.microsoft.com/office/mac/drawingml/2011/main" xmlns="" val="1"/>
             </a:ext>
           </a:extLst>
         </p:spPr>
@@ -1572,7 +1572,7 @@
           </a:ln>
           <a:extLst>
             <a:ext uri="{FAA26D3D-D897-4be2-8F04-BA451C77F1D7}">
-              <ma14:placeholderFlag xmlns="" xmlns:ma14="http://schemas.microsoft.com/office/mac/drawingml/2011/main" val="1"/>
+              <ma14:placeholderFlag xmlns:ma14="http://schemas.microsoft.com/office/mac/drawingml/2011/main" xmlns="" val="1"/>
             </a:ext>
           </a:extLst>
         </p:spPr>
@@ -1632,14 +1632,14 @@
           <a:noFill/>
           <a:extLst>
             <a:ext uri="{909E8E84-426E-40dd-AFC4-6F175D3DCCD1}">
-              <a14:hiddenFill xmlns="" xmlns:a14="http://schemas.microsoft.com/office/drawing/2010/main">
+              <a14:hiddenFill xmlns:a14="http://schemas.microsoft.com/office/drawing/2010/main" xmlns="">
                 <a:solidFill>
                   <a:srgbClr val="FFFFFF"/>
                 </a:solidFill>
               </a14:hiddenFill>
             </a:ext>
             <a:ext uri="{91240B29-F687-4f45-9708-019B960494DF}">
-              <a14:hiddenLine xmlns="" xmlns:a14="http://schemas.microsoft.com/office/drawing/2010/main" w="9525">
+              <a14:hiddenLine xmlns:a14="http://schemas.microsoft.com/office/drawing/2010/main" xmlns="" w="9525">
                 <a:solidFill>
                   <a:srgbClr val="000000"/>
                 </a:solidFill>
@@ -1799,7 +1799,7 @@
           </a:ln>
           <a:extLst>
             <a:ext uri="{FAA26D3D-D897-4be2-8F04-BA451C77F1D7}">
-              <ma14:placeholderFlag xmlns="" xmlns:ma14="http://schemas.microsoft.com/office/mac/drawingml/2011/main" val="1"/>
+              <ma14:placeholderFlag xmlns:ma14="http://schemas.microsoft.com/office/mac/drawingml/2011/main" xmlns="" val="1"/>
             </a:ext>
           </a:extLst>
         </p:spPr>
@@ -1828,7 +1828,7 @@
           </a:ln>
           <a:extLst>
             <a:ext uri="{FAA26D3D-D897-4be2-8F04-BA451C77F1D7}">
-              <ma14:placeholderFlag xmlns="" xmlns:ma14="http://schemas.microsoft.com/office/mac/drawingml/2011/main" val="1"/>
+              <ma14:placeholderFlag xmlns:ma14="http://schemas.microsoft.com/office/mac/drawingml/2011/main" xmlns="" val="1"/>
             </a:ext>
           </a:extLst>
         </p:spPr>
@@ -1888,14 +1888,14 @@
           <a:noFill/>
           <a:extLst>
             <a:ext uri="{909E8E84-426E-40dd-AFC4-6F175D3DCCD1}">
-              <a14:hiddenFill xmlns="" xmlns:a14="http://schemas.microsoft.com/office/drawing/2010/main">
+              <a14:hiddenFill xmlns:a14="http://schemas.microsoft.com/office/drawing/2010/main" xmlns="">
                 <a:solidFill>
                   <a:srgbClr val="FFFFFF"/>
                 </a:solidFill>
               </a14:hiddenFill>
             </a:ext>
             <a:ext uri="{91240B29-F687-4f45-9708-019B960494DF}">
-              <a14:hiddenLine xmlns="" xmlns:a14="http://schemas.microsoft.com/office/drawing/2010/main" w="9525">
+              <a14:hiddenLine xmlns:a14="http://schemas.microsoft.com/office/drawing/2010/main" xmlns="" w="9525">
                 <a:solidFill>
                   <a:srgbClr val="000000"/>
                 </a:solidFill>
@@ -2055,7 +2055,7 @@
           </a:ln>
           <a:extLst>
             <a:ext uri="{FAA26D3D-D897-4be2-8F04-BA451C77F1D7}">
-              <ma14:placeholderFlag xmlns="" xmlns:ma14="http://schemas.microsoft.com/office/mac/drawingml/2011/main" val="1"/>
+              <ma14:placeholderFlag xmlns:ma14="http://schemas.microsoft.com/office/mac/drawingml/2011/main" xmlns="" val="1"/>
             </a:ext>
           </a:extLst>
         </p:spPr>
@@ -2084,7 +2084,7 @@
           </a:ln>
           <a:extLst>
             <a:ext uri="{FAA26D3D-D897-4be2-8F04-BA451C77F1D7}">
-              <ma14:placeholderFlag xmlns="" xmlns:ma14="http://schemas.microsoft.com/office/mac/drawingml/2011/main" val="1"/>
+              <ma14:placeholderFlag xmlns:ma14="http://schemas.microsoft.com/office/mac/drawingml/2011/main" xmlns="" val="1"/>
             </a:ext>
           </a:extLst>
         </p:spPr>
@@ -2144,14 +2144,14 @@
           <a:noFill/>
           <a:extLst>
             <a:ext uri="{909E8E84-426E-40dd-AFC4-6F175D3DCCD1}">
-              <a14:hiddenFill xmlns="" xmlns:a14="http://schemas.microsoft.com/office/drawing/2010/main">
+              <a14:hiddenFill xmlns:a14="http://schemas.microsoft.com/office/drawing/2010/main" xmlns="">
                 <a:solidFill>
                   <a:srgbClr val="FFFFFF"/>
                 </a:solidFill>
               </a14:hiddenFill>
             </a:ext>
             <a:ext uri="{91240B29-F687-4f45-9708-019B960494DF}">
-              <a14:hiddenLine xmlns="" xmlns:a14="http://schemas.microsoft.com/office/drawing/2010/main" w="9525">
+              <a14:hiddenLine xmlns:a14="http://schemas.microsoft.com/office/drawing/2010/main" xmlns="" w="9525">
                 <a:solidFill>
                   <a:srgbClr val="000000"/>
                 </a:solidFill>
@@ -2311,7 +2311,7 @@
           </a:ln>
           <a:extLst>
             <a:ext uri="{FAA26D3D-D897-4be2-8F04-BA451C77F1D7}">
-              <ma14:placeholderFlag xmlns="" xmlns:ma14="http://schemas.microsoft.com/office/mac/drawingml/2011/main" val="1"/>
+              <ma14:placeholderFlag xmlns:ma14="http://schemas.microsoft.com/office/mac/drawingml/2011/main" xmlns="" val="1"/>
             </a:ext>
           </a:extLst>
         </p:spPr>
@@ -2340,7 +2340,7 @@
           </a:ln>
           <a:extLst>
             <a:ext uri="{FAA26D3D-D897-4be2-8F04-BA451C77F1D7}">
-              <ma14:placeholderFlag xmlns="" xmlns:ma14="http://schemas.microsoft.com/office/mac/drawingml/2011/main" val="1"/>
+              <ma14:placeholderFlag xmlns:ma14="http://schemas.microsoft.com/office/mac/drawingml/2011/main" xmlns="" val="1"/>
             </a:ext>
           </a:extLst>
         </p:spPr>
@@ -2400,14 +2400,14 @@
           <a:noFill/>
           <a:extLst>
             <a:ext uri="{909E8E84-426E-40dd-AFC4-6F175D3DCCD1}">
-              <a14:hiddenFill xmlns="" xmlns:a14="http://schemas.microsoft.com/office/drawing/2010/main">
+              <a14:hiddenFill xmlns:a14="http://schemas.microsoft.com/office/drawing/2010/main" xmlns="">
                 <a:solidFill>
                   <a:srgbClr val="FFFFFF"/>
                 </a:solidFill>
               </a14:hiddenFill>
             </a:ext>
             <a:ext uri="{91240B29-F687-4f45-9708-019B960494DF}">
-              <a14:hiddenLine xmlns="" xmlns:a14="http://schemas.microsoft.com/office/drawing/2010/main" w="9525">
+              <a14:hiddenLine xmlns:a14="http://schemas.microsoft.com/office/drawing/2010/main" xmlns="" w="9525">
                 <a:solidFill>
                   <a:srgbClr val="000000"/>
                 </a:solidFill>
@@ -2567,7 +2567,7 @@
           </a:ln>
           <a:extLst>
             <a:ext uri="{FAA26D3D-D897-4be2-8F04-BA451C77F1D7}">
-              <ma14:placeholderFlag xmlns="" xmlns:ma14="http://schemas.microsoft.com/office/mac/drawingml/2011/main" val="1"/>
+              <ma14:placeholderFlag xmlns:ma14="http://schemas.microsoft.com/office/mac/drawingml/2011/main" xmlns="" val="1"/>
             </a:ext>
           </a:extLst>
         </p:spPr>
@@ -2596,7 +2596,7 @@
           </a:ln>
           <a:extLst>
             <a:ext uri="{FAA26D3D-D897-4be2-8F04-BA451C77F1D7}">
-              <ma14:placeholderFlag xmlns="" xmlns:ma14="http://schemas.microsoft.com/office/mac/drawingml/2011/main" val="1"/>
+              <ma14:placeholderFlag xmlns:ma14="http://schemas.microsoft.com/office/mac/drawingml/2011/main" xmlns="" val="1"/>
             </a:ext>
           </a:extLst>
         </p:spPr>
@@ -2656,14 +2656,14 @@
           <a:noFill/>
           <a:extLst>
             <a:ext uri="{909E8E84-426E-40dd-AFC4-6F175D3DCCD1}">
-              <a14:hiddenFill xmlns="" xmlns:a14="http://schemas.microsoft.com/office/drawing/2010/main">
+              <a14:hiddenFill xmlns:a14="http://schemas.microsoft.com/office/drawing/2010/main" xmlns="">
                 <a:solidFill>
                   <a:srgbClr val="FFFFFF"/>
                 </a:solidFill>
               </a14:hiddenFill>
             </a:ext>
             <a:ext uri="{91240B29-F687-4f45-9708-019B960494DF}">
-              <a14:hiddenLine xmlns="" xmlns:a14="http://schemas.microsoft.com/office/drawing/2010/main" w="9525">
+              <a14:hiddenLine xmlns:a14="http://schemas.microsoft.com/office/drawing/2010/main" xmlns="" w="9525">
                 <a:solidFill>
                   <a:srgbClr val="000000"/>
                 </a:solidFill>
@@ -2823,7 +2823,7 @@
           </a:ln>
           <a:extLst>
             <a:ext uri="{FAA26D3D-D897-4be2-8F04-BA451C77F1D7}">
-              <ma14:placeholderFlag xmlns="" xmlns:ma14="http://schemas.microsoft.com/office/mac/drawingml/2011/main" val="1"/>
+              <ma14:placeholderFlag xmlns:ma14="http://schemas.microsoft.com/office/mac/drawingml/2011/main" xmlns="" val="1"/>
             </a:ext>
           </a:extLst>
         </p:spPr>
@@ -2852,7 +2852,7 @@
           </a:ln>
           <a:extLst>
             <a:ext uri="{FAA26D3D-D897-4be2-8F04-BA451C77F1D7}">
-              <ma14:placeholderFlag xmlns="" xmlns:ma14="http://schemas.microsoft.com/office/mac/drawingml/2011/main" val="1"/>
+              <ma14:placeholderFlag xmlns:ma14="http://schemas.microsoft.com/office/mac/drawingml/2011/main" xmlns="" val="1"/>
             </a:ext>
           </a:extLst>
         </p:spPr>
@@ -3019,14 +3019,14 @@
           <a:noFill/>
           <a:extLst>
             <a:ext uri="{909E8E84-426E-40dd-AFC4-6F175D3DCCD1}">
-              <a14:hiddenFill xmlns="" xmlns:a14="http://schemas.microsoft.com/office/drawing/2010/main">
+              <a14:hiddenFill xmlns:a14="http://schemas.microsoft.com/office/drawing/2010/main" xmlns="">
                 <a:solidFill>
                   <a:srgbClr val="FFFFFF"/>
                 </a:solidFill>
               </a14:hiddenFill>
             </a:ext>
             <a:ext uri="{91240B29-F687-4f45-9708-019B960494DF}">
-              <a14:hiddenLine xmlns="" xmlns:a14="http://schemas.microsoft.com/office/drawing/2010/main" w="9525">
+              <a14:hiddenLine xmlns:a14="http://schemas.microsoft.com/office/drawing/2010/main" xmlns="" w="9525">
                 <a:solidFill>
                   <a:srgbClr val="000000"/>
                 </a:solidFill>
@@ -3186,7 +3186,7 @@
           </a:ln>
           <a:extLst>
             <a:ext uri="{FAA26D3D-D897-4be2-8F04-BA451C77F1D7}">
-              <ma14:placeholderFlag xmlns="" xmlns:ma14="http://schemas.microsoft.com/office/mac/drawingml/2011/main" val="1"/>
+              <ma14:placeholderFlag xmlns:ma14="http://schemas.microsoft.com/office/mac/drawingml/2011/main" xmlns="" val="1"/>
             </a:ext>
           </a:extLst>
         </p:spPr>
@@ -3215,7 +3215,7 @@
           </a:ln>
           <a:extLst>
             <a:ext uri="{FAA26D3D-D897-4be2-8F04-BA451C77F1D7}">
-              <ma14:placeholderFlag xmlns="" xmlns:ma14="http://schemas.microsoft.com/office/mac/drawingml/2011/main" val="1"/>
+              <ma14:placeholderFlag xmlns:ma14="http://schemas.microsoft.com/office/mac/drawingml/2011/main" xmlns="" val="1"/>
             </a:ext>
           </a:extLst>
         </p:spPr>
@@ -3275,14 +3275,14 @@
           <a:noFill/>
           <a:extLst>
             <a:ext uri="{909E8E84-426E-40dd-AFC4-6F175D3DCCD1}">
-              <a14:hiddenFill xmlns="" xmlns:a14="http://schemas.microsoft.com/office/drawing/2010/main">
+              <a14:hiddenFill xmlns:a14="http://schemas.microsoft.com/office/drawing/2010/main" xmlns="">
                 <a:solidFill>
                   <a:srgbClr val="FFFFFF"/>
                 </a:solidFill>
               </a14:hiddenFill>
             </a:ext>
             <a:ext uri="{91240B29-F687-4f45-9708-019B960494DF}">
-              <a14:hiddenLine xmlns="" xmlns:a14="http://schemas.microsoft.com/office/drawing/2010/main" w="9525">
+              <a14:hiddenLine xmlns:a14="http://schemas.microsoft.com/office/drawing/2010/main" xmlns="" w="9525">
                 <a:solidFill>
                   <a:srgbClr val="000000"/>
                 </a:solidFill>
@@ -3442,7 +3442,7 @@
           </a:ln>
           <a:extLst>
             <a:ext uri="{FAA26D3D-D897-4be2-8F04-BA451C77F1D7}">
-              <ma14:placeholderFlag xmlns="" xmlns:ma14="http://schemas.microsoft.com/office/mac/drawingml/2011/main" val="1"/>
+              <ma14:placeholderFlag xmlns:ma14="http://schemas.microsoft.com/office/mac/drawingml/2011/main" xmlns="" val="1"/>
             </a:ext>
           </a:extLst>
         </p:spPr>
@@ -3471,7 +3471,7 @@
           </a:ln>
           <a:extLst>
             <a:ext uri="{FAA26D3D-D897-4be2-8F04-BA451C77F1D7}">
-              <ma14:placeholderFlag xmlns="" xmlns:ma14="http://schemas.microsoft.com/office/mac/drawingml/2011/main" val="1"/>
+              <ma14:placeholderFlag xmlns:ma14="http://schemas.microsoft.com/office/mac/drawingml/2011/main" xmlns="" val="1"/>
             </a:ext>
           </a:extLst>
         </p:spPr>
@@ -3531,14 +3531,14 @@
           <a:noFill/>
           <a:extLst>
             <a:ext uri="{909E8E84-426E-40dd-AFC4-6F175D3DCCD1}">
-              <a14:hiddenFill xmlns="" xmlns:a14="http://schemas.microsoft.com/office/drawing/2010/main">
+              <a14:hiddenFill xmlns:a14="http://schemas.microsoft.com/office/drawing/2010/main" xmlns="">
                 <a:solidFill>
                   <a:srgbClr val="FFFFFF"/>
                 </a:solidFill>
               </a14:hiddenFill>
             </a:ext>
             <a:ext uri="{91240B29-F687-4f45-9708-019B960494DF}">
-              <a14:hiddenLine xmlns="" xmlns:a14="http://schemas.microsoft.com/office/drawing/2010/main" w="9525">
+              <a14:hiddenLine xmlns:a14="http://schemas.microsoft.com/office/drawing/2010/main" xmlns="" w="9525">
                 <a:solidFill>
                   <a:srgbClr val="000000"/>
                 </a:solidFill>
@@ -3698,7 +3698,7 @@
           </a:ln>
           <a:extLst>
             <a:ext uri="{FAA26D3D-D897-4be2-8F04-BA451C77F1D7}">
-              <ma14:placeholderFlag xmlns="" xmlns:ma14="http://schemas.microsoft.com/office/mac/drawingml/2011/main" val="1"/>
+              <ma14:placeholderFlag xmlns:ma14="http://schemas.microsoft.com/office/mac/drawingml/2011/main" xmlns="" val="1"/>
             </a:ext>
           </a:extLst>
         </p:spPr>
@@ -3727,7 +3727,7 @@
           </a:ln>
           <a:extLst>
             <a:ext uri="{FAA26D3D-D897-4be2-8F04-BA451C77F1D7}">
-              <ma14:placeholderFlag xmlns="" xmlns:ma14="http://schemas.microsoft.com/office/mac/drawingml/2011/main" val="1"/>
+              <ma14:placeholderFlag xmlns:ma14="http://schemas.microsoft.com/office/mac/drawingml/2011/main" xmlns="" val="1"/>
             </a:ext>
           </a:extLst>
         </p:spPr>
@@ -3980,7 +3980,7 @@
         <p:spPr/>
         <p:txBody>
           <a:bodyPr>
-            <a:normAutofit fontScale="55000" lnSpcReduction="20000"/>
+            <a:normAutofit fontScale="77500" lnSpcReduction="20000"/>
           </a:bodyPr>
           <a:lstStyle/>
           <a:p>
@@ -4348,7 +4348,7 @@
         <p:spPr/>
         <p:txBody>
           <a:bodyPr>
-            <a:normAutofit fontScale="55000" lnSpcReduction="20000"/>
+            <a:normAutofit fontScale="85000" lnSpcReduction="20000"/>
           </a:bodyPr>
           <a:lstStyle/>
           <a:p>
@@ -4720,14 +4720,14 @@
           </a:ln>
           <a:extLst>
             <a:ext uri="{909E8E84-426E-40dd-AFC4-6F175D3DCCD1}">
-              <a14:hiddenFill xmlns="" xmlns:a14="http://schemas.microsoft.com/office/drawing/2010/main">
+              <a14:hiddenFill xmlns:a14="http://schemas.microsoft.com/office/drawing/2010/main" xmlns="">
                 <a:solidFill>
                   <a:srgbClr val="FFFFFF"/>
                 </a:solidFill>
               </a14:hiddenFill>
             </a:ext>
             <a:ext uri="{91240B29-F687-4f45-9708-019B960494DF}">
-              <a14:hiddenLine xmlns="" xmlns:a14="http://schemas.microsoft.com/office/drawing/2010/main" w="9525">
+              <a14:hiddenLine xmlns:a14="http://schemas.microsoft.com/office/drawing/2010/main" xmlns="" w="9525">
                 <a:solidFill>
                   <a:srgbClr val="000000"/>
                 </a:solidFill>
@@ -6744,14 +6744,14 @@
           </a:ln>
           <a:extLst>
             <a:ext uri="{909E8E84-426E-40dd-AFC4-6F175D3DCCD1}">
-              <a14:hiddenFill xmlns="" xmlns:a14="http://schemas.microsoft.com/office/drawing/2010/main">
+              <a14:hiddenFill xmlns:a14="http://schemas.microsoft.com/office/drawing/2010/main" xmlns="">
                 <a:solidFill>
                   <a:srgbClr val="FFFFFF"/>
                 </a:solidFill>
               </a14:hiddenFill>
             </a:ext>
             <a:ext uri="{91240B29-F687-4f45-9708-019B960494DF}">
-              <a14:hiddenLine xmlns="" xmlns:a14="http://schemas.microsoft.com/office/drawing/2010/main" w="9525">
+              <a14:hiddenLine xmlns:a14="http://schemas.microsoft.com/office/drawing/2010/main" xmlns="" w="9525">
                 <a:solidFill>
                   <a:srgbClr val="000000"/>
                 </a:solidFill>
@@ -6761,7 +6761,7 @@
               </a14:hiddenLine>
             </a:ext>
             <a:ext uri="{FAA26D3D-D897-4be2-8F04-BA451C77F1D7}">
-              <ma14:placeholderFlag xmlns="" xmlns:ma14="http://schemas.microsoft.com/office/mac/drawingml/2011/main" val="1"/>
+              <ma14:placeholderFlag xmlns:ma14="http://schemas.microsoft.com/office/mac/drawingml/2011/main" xmlns="" val="1"/>
             </a:ext>
           </a:extLst>
         </p:spPr>
@@ -6805,14 +6805,14 @@
           </a:ln>
           <a:extLst>
             <a:ext uri="{909E8E84-426E-40dd-AFC4-6F175D3DCCD1}">
-              <a14:hiddenFill xmlns="" xmlns:a14="http://schemas.microsoft.com/office/drawing/2010/main">
+              <a14:hiddenFill xmlns:a14="http://schemas.microsoft.com/office/drawing/2010/main" xmlns="">
                 <a:solidFill>
                   <a:srgbClr val="FFFFFF"/>
                 </a:solidFill>
               </a14:hiddenFill>
             </a:ext>
             <a:ext uri="{91240B29-F687-4f45-9708-019B960494DF}">
-              <a14:hiddenLine xmlns="" xmlns:a14="http://schemas.microsoft.com/office/drawing/2010/main" w="9525">
+              <a14:hiddenLine xmlns:a14="http://schemas.microsoft.com/office/drawing/2010/main" xmlns="" w="9525">
                 <a:solidFill>
                   <a:srgbClr val="000000"/>
                 </a:solidFill>
@@ -6822,7 +6822,7 @@
               </a14:hiddenLine>
             </a:ext>
             <a:ext uri="{FAA26D3D-D897-4be2-8F04-BA451C77F1D7}">
-              <ma14:placeholderFlag xmlns="" xmlns:ma14="http://schemas.microsoft.com/office/mac/drawingml/2011/main" val="1"/>
+              <ma14:placeholderFlag xmlns:ma14="http://schemas.microsoft.com/office/mac/drawingml/2011/main" xmlns="" val="1"/>
             </a:ext>
           </a:extLst>
         </p:spPr>
@@ -6914,7 +6914,7 @@
               <a:pPr>
                 <a:defRPr/>
               </a:pPr>
-              <a:t>11/5/19</a:t>
+              <a:t>11/10/19</a:t>
             </a:fld>
             <a:endParaRPr lang="en-US"/>
           </a:p>
@@ -7440,14 +7440,20 @@
       </p:grpSpPr>
       <p:sp>
         <p:nvSpPr>
-          <p:cNvPr id="57" name="Rectangle 56"/>
+          <p:cNvPr id="10" name="Rectangle 9">
+            <a:extLst>
+              <a:ext uri="{FF2B5EF4-FFF2-40B4-BE49-F238E27FC236}">
+                <a16:creationId xmlns:a16="http://schemas.microsoft.com/office/drawing/2014/main" id="{8CC33B2E-2B58-7849-BDE5-9D114CED2104}"/>
+              </a:ext>
+            </a:extLst>
+          </p:cNvPr>
           <p:cNvSpPr/>
           <p:nvPr/>
         </p:nvSpPr>
         <p:spPr>
           <a:xfrm>
-            <a:off x="0" y="2514600"/>
-            <a:ext cx="6172200" cy="4343400"/>
+            <a:off x="0" y="2522834"/>
+            <a:ext cx="9144000" cy="4335166"/>
           </a:xfrm>
           <a:prstGeom prst="rect">
             <a:avLst/>
@@ -7482,7 +7488,7 @@
             <a:pPr algn="ctr">
               <a:defRPr/>
             </a:pPr>
-            <a:endParaRPr lang="en-US" sz="1800">
+            <a:endParaRPr lang="en-US">
               <a:solidFill>
                 <a:srgbClr val="FFFFFF"/>
               </a:solidFill>
@@ -7493,114 +7499,6 @@
           </a:p>
         </p:txBody>
       </p:sp>
-      <p:pic>
-        <p:nvPicPr>
-          <p:cNvPr id="10242" name="Picture 4" descr="TGI_logo_V_2color_bevel.tiff"/>
-          <p:cNvPicPr>
-            <a:picLocks noChangeAspect="1"/>
-          </p:cNvPicPr>
-          <p:nvPr/>
-        </p:nvPicPr>
-        <p:blipFill>
-          <a:blip r:embed="rId2">
-            <a:extLst>
-              <a:ext uri="{28A0092B-C50C-407E-A947-70E740481C1C}">
-                <a14:useLocalDpi xmlns:a14="http://schemas.microsoft.com/office/drawing/2010/main" val="0"/>
-              </a:ext>
-            </a:extLst>
-          </a:blip>
-          <a:srcRect l="31865" t="30911" r="32492" b="27831"/>
-          <a:stretch>
-            <a:fillRect/>
-          </a:stretch>
-        </p:blipFill>
-        <p:spPr bwMode="auto">
-          <a:xfrm>
-            <a:off x="6588125" y="3744913"/>
-            <a:ext cx="2181225" cy="1893887"/>
-          </a:xfrm>
-          <a:prstGeom prst="rect">
-            <a:avLst/>
-          </a:prstGeom>
-          <a:noFill/>
-          <a:ln>
-            <a:noFill/>
-          </a:ln>
-          <a:extLst>
-            <a:ext uri="{909E8E84-426E-40dd-AFC4-6F175D3DCCD1}">
-              <a14:hiddenFill xmlns="" xmlns:a14="http://schemas.microsoft.com/office/drawing/2010/main">
-                <a:solidFill>
-                  <a:srgbClr val="FFFFFF"/>
-                </a:solidFill>
-              </a14:hiddenFill>
-            </a:ext>
-            <a:ext uri="{91240B29-F687-4f45-9708-019B960494DF}">
-              <a14:hiddenLine xmlns="" xmlns:a14="http://schemas.microsoft.com/office/drawing/2010/main" w="9525">
-                <a:solidFill>
-                  <a:srgbClr val="000000"/>
-                </a:solidFill>
-                <a:miter lim="800000"/>
-                <a:headEnd/>
-                <a:tailEnd/>
-              </a14:hiddenLine>
-            </a:ext>
-          </a:extLst>
-        </p:spPr>
-      </p:pic>
-      <p:pic>
-        <p:nvPicPr>
-          <p:cNvPr id="10243" name="Picture 1" descr="RNA-Seq-alignment.png"/>
-          <p:cNvPicPr>
-            <a:picLocks noChangeAspect="1"/>
-          </p:cNvPicPr>
-          <p:nvPr/>
-        </p:nvPicPr>
-        <p:blipFill>
-          <a:blip r:embed="rId3">
-            <a:extLst>
-              <a:ext uri="{28A0092B-C50C-407E-A947-70E740481C1C}">
-                <a14:useLocalDpi xmlns:a14="http://schemas.microsoft.com/office/drawing/2010/main" val="0"/>
-              </a:ext>
-            </a:extLst>
-          </a:blip>
-          <a:srcRect/>
-          <a:stretch>
-            <a:fillRect/>
-          </a:stretch>
-        </p:blipFill>
-        <p:spPr bwMode="auto">
-          <a:xfrm>
-            <a:off x="900113" y="2636838"/>
-            <a:ext cx="4248150" cy="4068762"/>
-          </a:xfrm>
-          <a:prstGeom prst="rect">
-            <a:avLst/>
-          </a:prstGeom>
-          <a:noFill/>
-          <a:ln>
-            <a:noFill/>
-          </a:ln>
-          <a:extLst>
-            <a:ext uri="{909E8E84-426E-40dd-AFC4-6F175D3DCCD1}">
-              <a14:hiddenFill xmlns="" xmlns:a14="http://schemas.microsoft.com/office/drawing/2010/main">
-                <a:solidFill>
-                  <a:srgbClr val="FFFFFF"/>
-                </a:solidFill>
-              </a14:hiddenFill>
-            </a:ext>
-            <a:ext uri="{91240B29-F687-4f45-9708-019B960494DF}">
-              <a14:hiddenLine xmlns="" xmlns:a14="http://schemas.microsoft.com/office/drawing/2010/main" w="9525">
-                <a:solidFill>
-                  <a:srgbClr val="000000"/>
-                </a:solidFill>
-                <a:miter lim="800000"/>
-                <a:headEnd/>
-                <a:tailEnd/>
-              </a14:hiddenLine>
-            </a:ext>
-          </a:extLst>
-        </p:spPr>
-      </p:pic>
       <p:sp>
         <p:nvSpPr>
           <p:cNvPr id="10244" name="Title 1"/>
@@ -7623,14 +7521,14 @@
           </a:ln>
           <a:extLst>
             <a:ext uri="{909E8E84-426E-40dd-AFC4-6F175D3DCCD1}">
-              <a14:hiddenFill xmlns="" xmlns:a14="http://schemas.microsoft.com/office/drawing/2010/main">
+              <a14:hiddenFill xmlns:a14="http://schemas.microsoft.com/office/drawing/2010/main" xmlns="">
                 <a:solidFill>
                   <a:srgbClr val="FFFFFF"/>
                 </a:solidFill>
               </a14:hiddenFill>
             </a:ext>
             <a:ext uri="{91240B29-F687-4f45-9708-019B960494DF}">
-              <a14:hiddenLine xmlns="" xmlns:a14="http://schemas.microsoft.com/office/drawing/2010/main" w="9525">
+              <a14:hiddenLine xmlns:a14="http://schemas.microsoft.com/office/drawing/2010/main" xmlns="" w="9525">
                 <a:solidFill>
                   <a:srgbClr val="000000"/>
                 </a:solidFill>
@@ -7944,6 +7842,156 @@
           </a:p>
         </p:txBody>
       </p:sp>
+      <p:pic>
+        <p:nvPicPr>
+          <p:cNvPr id="9" name="Picture 4" descr="TGI_logo_V_2color_bevel.tiff">
+            <a:extLst>
+              <a:ext uri="{FF2B5EF4-FFF2-40B4-BE49-F238E27FC236}">
+                <a16:creationId xmlns:a16="http://schemas.microsoft.com/office/drawing/2014/main" id="{92F88240-00F3-264C-8D3A-97759341F802}"/>
+              </a:ext>
+            </a:extLst>
+          </p:cNvPr>
+          <p:cNvPicPr>
+            <a:picLocks noChangeAspect="1"/>
+          </p:cNvPicPr>
+          <p:nvPr/>
+        </p:nvPicPr>
+        <p:blipFill>
+          <a:blip r:embed="rId2">
+            <a:extLst>
+              <a:ext uri="{28A0092B-C50C-407E-A947-70E740481C1C}">
+                <a14:useLocalDpi xmlns:a14="http://schemas.microsoft.com/office/drawing/2010/main" val="0"/>
+              </a:ext>
+            </a:extLst>
+          </a:blip>
+          <a:srcRect l="31865" t="30911" r="32492" b="27831"/>
+          <a:stretch>
+            <a:fillRect/>
+          </a:stretch>
+        </p:blipFill>
+        <p:spPr bwMode="auto">
+          <a:xfrm>
+            <a:off x="6804248" y="3886007"/>
+            <a:ext cx="2224143" cy="1931151"/>
+          </a:xfrm>
+          <a:prstGeom prst="rect">
+            <a:avLst/>
+          </a:prstGeom>
+          <a:noFill/>
+          <a:ln>
+            <a:noFill/>
+          </a:ln>
+          <a:extLst>
+            <a:ext uri="{909E8E84-426E-40dd-AFC4-6F175D3DCCD1}">
+              <a14:hiddenFill xmlns="" xmlns:a14="http://schemas.microsoft.com/office/drawing/2010/main">
+                <a:solidFill>
+                  <a:srgbClr val="FFFFFF"/>
+                </a:solidFill>
+              </a14:hiddenFill>
+            </a:ext>
+            <a:ext uri="{91240B29-F687-4f45-9708-019B960494DF}">
+              <a14:hiddenLine xmlns="" xmlns:a14="http://schemas.microsoft.com/office/drawing/2010/main" w="9525">
+                <a:solidFill>
+                  <a:srgbClr val="000000"/>
+                </a:solidFill>
+                <a:miter lim="800000"/>
+                <a:headEnd/>
+                <a:tailEnd/>
+              </a14:hiddenLine>
+            </a:ext>
+          </a:extLst>
+        </p:spPr>
+      </p:pic>
+      <p:pic>
+        <p:nvPicPr>
+          <p:cNvPr id="11" name="Picture 10">
+            <a:extLst>
+              <a:ext uri="{FF2B5EF4-FFF2-40B4-BE49-F238E27FC236}">
+                <a16:creationId xmlns:a16="http://schemas.microsoft.com/office/drawing/2014/main" id="{9F353E93-A688-004C-B399-25882A2A25CF}"/>
+              </a:ext>
+            </a:extLst>
+          </p:cNvPr>
+          <p:cNvPicPr>
+            <a:picLocks noChangeAspect="1"/>
+          </p:cNvPicPr>
+          <p:nvPr/>
+        </p:nvPicPr>
+        <p:blipFill>
+          <a:blip r:embed="rId3"/>
+          <a:stretch>
+            <a:fillRect/>
+          </a:stretch>
+        </p:blipFill>
+        <p:spPr>
+          <a:xfrm>
+            <a:off x="155872" y="3287167"/>
+            <a:ext cx="3128830" cy="3128830"/>
+          </a:xfrm>
+          <a:prstGeom prst="rect">
+            <a:avLst/>
+          </a:prstGeom>
+        </p:spPr>
+      </p:pic>
+      <p:pic>
+        <p:nvPicPr>
+          <p:cNvPr id="12" name="Picture 1" descr="RNA-Seq-alignment.png">
+            <a:extLst>
+              <a:ext uri="{FF2B5EF4-FFF2-40B4-BE49-F238E27FC236}">
+                <a16:creationId xmlns:a16="http://schemas.microsoft.com/office/drawing/2014/main" id="{5BFF4C48-5997-A74A-B649-0DEA98B46FFC}"/>
+              </a:ext>
+            </a:extLst>
+          </p:cNvPr>
+          <p:cNvPicPr>
+            <a:picLocks noChangeAspect="1"/>
+          </p:cNvPicPr>
+          <p:nvPr/>
+        </p:nvPicPr>
+        <p:blipFill>
+          <a:blip r:embed="rId4">
+            <a:extLst>
+              <a:ext uri="{28A0092B-C50C-407E-A947-70E740481C1C}">
+                <a14:useLocalDpi xmlns:a14="http://schemas.microsoft.com/office/drawing/2010/main" val="0"/>
+              </a:ext>
+            </a:extLst>
+          </a:blip>
+          <a:srcRect/>
+          <a:stretch>
+            <a:fillRect/>
+          </a:stretch>
+        </p:blipFill>
+        <p:spPr bwMode="auto">
+          <a:xfrm>
+            <a:off x="3408807" y="3284984"/>
+            <a:ext cx="3271336" cy="3133196"/>
+          </a:xfrm>
+          <a:prstGeom prst="rect">
+            <a:avLst/>
+          </a:prstGeom>
+          <a:noFill/>
+          <a:ln>
+            <a:noFill/>
+          </a:ln>
+          <a:extLst>
+            <a:ext uri="{909E8E84-426E-40dd-AFC4-6F175D3DCCD1}">
+              <a14:hiddenFill xmlns="" xmlns:a14="http://schemas.microsoft.com/office/drawing/2010/main">
+                <a:solidFill>
+                  <a:srgbClr val="FFFFFF"/>
+                </a:solidFill>
+              </a14:hiddenFill>
+            </a:ext>
+            <a:ext uri="{91240B29-F687-4f45-9708-019B960494DF}">
+              <a14:hiddenLine xmlns="" xmlns:a14="http://schemas.microsoft.com/office/drawing/2010/main" w="9525">
+                <a:solidFill>
+                  <a:srgbClr val="000000"/>
+                </a:solidFill>
+                <a:miter lim="800000"/>
+                <a:headEnd/>
+                <a:tailEnd/>
+              </a14:hiddenLine>
+            </a:ext>
+          </a:extLst>
+        </p:spPr>
+      </p:pic>
     </p:spTree>
     <p:extLst>
       <p:ext uri="{BB962C8B-B14F-4D97-AF65-F5344CB8AC3E}">
@@ -8903,14 +8951,14 @@
           </a:ln>
           <a:extLst>
             <a:ext uri="{909E8E84-426E-40dd-AFC4-6F175D3DCCD1}">
-              <a14:hiddenFill xmlns="" xmlns:a14="http://schemas.microsoft.com/office/drawing/2010/main">
+              <a14:hiddenFill xmlns:a14="http://schemas.microsoft.com/office/drawing/2010/main" xmlns="">
                 <a:solidFill>
                   <a:srgbClr val="FFFFFF"/>
                 </a:solidFill>
               </a14:hiddenFill>
             </a:ext>
             <a:ext uri="{91240B29-F687-4f45-9708-019B960494DF}">
-              <a14:hiddenLine xmlns="" xmlns:a14="http://schemas.microsoft.com/office/drawing/2010/main" w="9525">
+              <a14:hiddenLine xmlns:a14="http://schemas.microsoft.com/office/drawing/2010/main" xmlns="" w="9525">
                 <a:solidFill>
                   <a:srgbClr val="000000"/>
                 </a:solidFill>
@@ -10449,7 +10497,7 @@
         <p:spPr/>
         <p:txBody>
           <a:bodyPr>
-            <a:normAutofit fontScale="92500" lnSpcReduction="20000"/>
+            <a:normAutofit fontScale="92500" lnSpcReduction="10000"/>
           </a:bodyPr>
           <a:lstStyle/>
           <a:p>
@@ -10861,14 +10909,14 @@
           </a:ln>
           <a:extLst>
             <a:ext uri="{909E8E84-426E-40dd-AFC4-6F175D3DCCD1}">
-              <a14:hiddenFill xmlns="" xmlns:a14="http://schemas.microsoft.com/office/drawing/2010/main">
+              <a14:hiddenFill xmlns:a14="http://schemas.microsoft.com/office/drawing/2010/main" xmlns="">
                 <a:solidFill>
                   <a:srgbClr val="FFFFFF"/>
                 </a:solidFill>
               </a14:hiddenFill>
             </a:ext>
             <a:ext uri="{91240B29-F687-4f45-9708-019B960494DF}">
-              <a14:hiddenLine xmlns="" xmlns:a14="http://schemas.microsoft.com/office/drawing/2010/main" w="9525">
+              <a14:hiddenLine xmlns:a14="http://schemas.microsoft.com/office/drawing/2010/main" xmlns="" w="9525">
                 <a:solidFill>
                   <a:srgbClr val="000000"/>
                 </a:solidFill>
@@ -12238,14 +12286,14 @@
           </a:ln>
           <a:extLst>
             <a:ext uri="{909E8E84-426E-40dd-AFC4-6F175D3DCCD1}">
-              <a14:hiddenFill xmlns="" xmlns:a14="http://schemas.microsoft.com/office/drawing/2010/main">
+              <a14:hiddenFill xmlns:a14="http://schemas.microsoft.com/office/drawing/2010/main" xmlns="">
                 <a:solidFill>
                   <a:srgbClr val="FFFFFF"/>
                 </a:solidFill>
               </a14:hiddenFill>
             </a:ext>
             <a:ext uri="{91240B29-F687-4f45-9708-019B960494DF}">
-              <a14:hiddenLine xmlns="" xmlns:a14="http://schemas.microsoft.com/office/drawing/2010/main" w="9525">
+              <a14:hiddenLine xmlns:a14="http://schemas.microsoft.com/office/drawing/2010/main" xmlns="" w="9525">
                 <a:solidFill>
                   <a:srgbClr val="000000"/>
                 </a:solidFill>
@@ -12292,14 +12340,14 @@
           </a:ln>
           <a:extLst>
             <a:ext uri="{909E8E84-426E-40dd-AFC4-6F175D3DCCD1}">
-              <a14:hiddenFill xmlns="" xmlns:a14="http://schemas.microsoft.com/office/drawing/2010/main">
+              <a14:hiddenFill xmlns:a14="http://schemas.microsoft.com/office/drawing/2010/main" xmlns="">
                 <a:solidFill>
                   <a:srgbClr val="FFFFFF"/>
                 </a:solidFill>
               </a14:hiddenFill>
             </a:ext>
             <a:ext uri="{91240B29-F687-4f45-9708-019B960494DF}">
-              <a14:hiddenLine xmlns="" xmlns:a14="http://schemas.microsoft.com/office/drawing/2010/main" w="9525">
+              <a14:hiddenLine xmlns:a14="http://schemas.microsoft.com/office/drawing/2010/main" xmlns="" w="9525">
                 <a:solidFill>
                   <a:srgbClr val="000000"/>
                 </a:solidFill>
@@ -12333,14 +12381,14 @@
           </a:ln>
           <a:extLst>
             <a:ext uri="{909E8E84-426E-40dd-AFC4-6F175D3DCCD1}">
-              <a14:hiddenFill xmlns="" xmlns:a14="http://schemas.microsoft.com/office/drawing/2010/main">
+              <a14:hiddenFill xmlns:a14="http://schemas.microsoft.com/office/drawing/2010/main" xmlns="">
                 <a:solidFill>
                   <a:srgbClr val="FFFFFF"/>
                 </a:solidFill>
               </a14:hiddenFill>
             </a:ext>
             <a:ext uri="{91240B29-F687-4f45-9708-019B960494DF}">
-              <a14:hiddenLine xmlns="" xmlns:a14="http://schemas.microsoft.com/office/drawing/2010/main" w="9525">
+              <a14:hiddenLine xmlns:a14="http://schemas.microsoft.com/office/drawing/2010/main" xmlns="" w="9525">
                 <a:solidFill>
                   <a:srgbClr val="000000"/>
                 </a:solidFill>
@@ -12494,14 +12542,14 @@
           </a:ln>
           <a:extLst>
             <a:ext uri="{909E8E84-426E-40dd-AFC4-6F175D3DCCD1}">
-              <a14:hiddenFill xmlns="" xmlns:a14="http://schemas.microsoft.com/office/drawing/2010/main">
+              <a14:hiddenFill xmlns:a14="http://schemas.microsoft.com/office/drawing/2010/main" xmlns="">
                 <a:solidFill>
                   <a:srgbClr val="FFFFFF"/>
                 </a:solidFill>
               </a14:hiddenFill>
             </a:ext>
             <a:ext uri="{91240B29-F687-4f45-9708-019B960494DF}">
-              <a14:hiddenLine xmlns="" xmlns:a14="http://schemas.microsoft.com/office/drawing/2010/main" w="9525">
+              <a14:hiddenLine xmlns:a14="http://schemas.microsoft.com/office/drawing/2010/main" xmlns="" w="9525">
                 <a:solidFill>
                   <a:srgbClr val="000000"/>
                 </a:solidFill>

</xml_diff>

<commit_message>
fix more problems with the slide templates
</commit_message>
<xml_diff>
--- a/assets/lectures/cshl/2019/full/RNASeq_Module0_IntrotoRNA.pptx
+++ b/assets/lectures/cshl/2019/full/RNASeq_Module0_IntrotoRNA.pptx
@@ -4771,350 +4771,6 @@
       </p:grpSpPr>
       <p:sp>
         <p:nvSpPr>
-          <p:cNvPr id="4" name="Rectangle 3"/>
-          <p:cNvSpPr/>
-          <p:nvPr userDrawn="1"/>
-        </p:nvSpPr>
-        <p:spPr>
-          <a:xfrm>
-            <a:off x="0" y="6400800"/>
-            <a:ext cx="9144000" cy="457200"/>
-          </a:xfrm>
-          <a:prstGeom prst="rect">
-            <a:avLst/>
-          </a:prstGeom>
-          <a:solidFill>
-            <a:srgbClr val="CA0000"/>
-          </a:solidFill>
-          <a:ln>
-            <a:noFill/>
-          </a:ln>
-        </p:spPr>
-        <p:style>
-          <a:lnRef idx="2">
-            <a:schemeClr val="accent1">
-              <a:shade val="50000"/>
-            </a:schemeClr>
-          </a:lnRef>
-          <a:fillRef idx="1">
-            <a:schemeClr val="accent1"/>
-          </a:fillRef>
-          <a:effectRef idx="0">
-            <a:schemeClr val="accent1"/>
-          </a:effectRef>
-          <a:fontRef idx="minor">
-            <a:schemeClr val="lt1"/>
-          </a:fontRef>
-        </p:style>
-        <p:txBody>
-          <a:bodyPr anchor="ctr"/>
-          <a:lstStyle/>
-          <a:p>
-            <a:pPr algn="ctr">
-              <a:defRPr/>
-            </a:pPr>
-            <a:endParaRPr lang="en-US" sz="1800">
-              <a:solidFill>
-                <a:srgbClr val="FFFFFF"/>
-              </a:solidFill>
-              <a:latin typeface="Segoe UI" charset="0"/>
-              <a:ea typeface="ＭＳ Ｐゴシック" charset="0"/>
-              <a:cs typeface="ＭＳ Ｐゴシック" charset="0"/>
-            </a:endParaRPr>
-          </a:p>
-        </p:txBody>
-      </p:sp>
-      <p:sp>
-        <p:nvSpPr>
-          <p:cNvPr id="5" name="TextBox 4"/>
-          <p:cNvSpPr txBox="1"/>
-          <p:nvPr userDrawn="1"/>
-        </p:nvSpPr>
-        <p:spPr>
-          <a:xfrm>
-            <a:off x="76200" y="6429375"/>
-            <a:ext cx="6705600" cy="396875"/>
-          </a:xfrm>
-          <a:prstGeom prst="rect">
-            <a:avLst/>
-          </a:prstGeom>
-          <a:noFill/>
-        </p:spPr>
-        <p:txBody>
-          <a:bodyPr>
-            <a:spAutoFit/>
-          </a:bodyPr>
-          <a:lstStyle>
-            <a:lvl1pPr eaLnBrk="0" hangingPunct="0">
-              <a:defRPr sz="2400">
-                <a:solidFill>
-                  <a:schemeClr val="tx1"/>
-                </a:solidFill>
-                <a:latin typeface="Arial" charset="0"/>
-                <a:ea typeface="ＭＳ Ｐゴシック" charset="0"/>
-                <a:cs typeface="ＭＳ Ｐゴシック" charset="0"/>
-              </a:defRPr>
-            </a:lvl1pPr>
-            <a:lvl2pPr marL="37931725" indent="-37474525" eaLnBrk="0" hangingPunct="0">
-              <a:defRPr sz="2400">
-                <a:solidFill>
-                  <a:schemeClr val="tx1"/>
-                </a:solidFill>
-                <a:latin typeface="Arial" charset="0"/>
-                <a:ea typeface="ＭＳ Ｐゴシック" charset="0"/>
-              </a:defRPr>
-            </a:lvl2pPr>
-            <a:lvl3pPr eaLnBrk="0" hangingPunct="0">
-              <a:defRPr sz="2400">
-                <a:solidFill>
-                  <a:schemeClr val="tx1"/>
-                </a:solidFill>
-                <a:latin typeface="Arial" charset="0"/>
-                <a:ea typeface="ＭＳ Ｐゴシック" charset="0"/>
-              </a:defRPr>
-            </a:lvl3pPr>
-            <a:lvl4pPr eaLnBrk="0" hangingPunct="0">
-              <a:defRPr sz="2400">
-                <a:solidFill>
-                  <a:schemeClr val="tx1"/>
-                </a:solidFill>
-                <a:latin typeface="Arial" charset="0"/>
-                <a:ea typeface="ＭＳ Ｐゴシック" charset="0"/>
-              </a:defRPr>
-            </a:lvl4pPr>
-            <a:lvl5pPr eaLnBrk="0" hangingPunct="0">
-              <a:defRPr sz="2400">
-                <a:solidFill>
-                  <a:schemeClr val="tx1"/>
-                </a:solidFill>
-                <a:latin typeface="Arial" charset="0"/>
-                <a:ea typeface="ＭＳ Ｐゴシック" charset="0"/>
-              </a:defRPr>
-            </a:lvl5pPr>
-            <a:lvl6pPr marL="457200" eaLnBrk="0" fontAlgn="base" hangingPunct="0">
-              <a:spcBef>
-                <a:spcPct val="0"/>
-              </a:spcBef>
-              <a:spcAft>
-                <a:spcPct val="0"/>
-              </a:spcAft>
-              <a:defRPr sz="2400">
-                <a:solidFill>
-                  <a:schemeClr val="tx1"/>
-                </a:solidFill>
-                <a:latin typeface="Arial" charset="0"/>
-                <a:ea typeface="ＭＳ Ｐゴシック" charset="0"/>
-              </a:defRPr>
-            </a:lvl6pPr>
-            <a:lvl7pPr marL="914400" eaLnBrk="0" fontAlgn="base" hangingPunct="0">
-              <a:spcBef>
-                <a:spcPct val="0"/>
-              </a:spcBef>
-              <a:spcAft>
-                <a:spcPct val="0"/>
-              </a:spcAft>
-              <a:defRPr sz="2400">
-                <a:solidFill>
-                  <a:schemeClr val="tx1"/>
-                </a:solidFill>
-                <a:latin typeface="Arial" charset="0"/>
-                <a:ea typeface="ＭＳ Ｐゴシック" charset="0"/>
-              </a:defRPr>
-            </a:lvl7pPr>
-            <a:lvl8pPr marL="1371600" eaLnBrk="0" fontAlgn="base" hangingPunct="0">
-              <a:spcBef>
-                <a:spcPct val="0"/>
-              </a:spcBef>
-              <a:spcAft>
-                <a:spcPct val="0"/>
-              </a:spcAft>
-              <a:defRPr sz="2400">
-                <a:solidFill>
-                  <a:schemeClr val="tx1"/>
-                </a:solidFill>
-                <a:latin typeface="Arial" charset="0"/>
-                <a:ea typeface="ＭＳ Ｐゴシック" charset="0"/>
-              </a:defRPr>
-            </a:lvl8pPr>
-            <a:lvl9pPr marL="1828800" eaLnBrk="0" fontAlgn="base" hangingPunct="0">
-              <a:spcBef>
-                <a:spcPct val="0"/>
-              </a:spcBef>
-              <a:spcAft>
-                <a:spcPct val="0"/>
-              </a:spcAft>
-              <a:defRPr sz="2400">
-                <a:solidFill>
-                  <a:schemeClr val="tx1"/>
-                </a:solidFill>
-                <a:latin typeface="Arial" charset="0"/>
-                <a:ea typeface="ＭＳ Ｐゴシック" charset="0"/>
-              </a:defRPr>
-            </a:lvl9pPr>
-          </a:lstStyle>
-          <a:p>
-            <a:pPr eaLnBrk="1" hangingPunct="1">
-              <a:defRPr/>
-            </a:pPr>
-            <a:r>
-              <a:rPr lang="en-US" sz="2000" b="1">
-                <a:solidFill>
-                  <a:schemeClr val="bg1"/>
-                </a:solidFill>
-                <a:latin typeface="Calibri" charset="0"/>
-                <a:cs typeface="Calibri" charset="0"/>
-              </a:rPr>
-              <a:t>RNA sequencing and analysis</a:t>
-            </a:r>
-          </a:p>
-        </p:txBody>
-      </p:sp>
-      <p:sp>
-        <p:nvSpPr>
-          <p:cNvPr id="6" name="TextBox 5"/>
-          <p:cNvSpPr txBox="1"/>
-          <p:nvPr userDrawn="1"/>
-        </p:nvSpPr>
-        <p:spPr>
-          <a:xfrm>
-            <a:off x="6172200" y="6477000"/>
-            <a:ext cx="2895600" cy="338138"/>
-          </a:xfrm>
-          <a:prstGeom prst="rect">
-            <a:avLst/>
-          </a:prstGeom>
-          <a:noFill/>
-        </p:spPr>
-        <p:txBody>
-          <a:bodyPr>
-            <a:spAutoFit/>
-          </a:bodyPr>
-          <a:lstStyle>
-            <a:lvl1pPr eaLnBrk="0" hangingPunct="0">
-              <a:defRPr sz="2400">
-                <a:solidFill>
-                  <a:schemeClr val="tx1"/>
-                </a:solidFill>
-                <a:latin typeface="Arial" charset="0"/>
-                <a:ea typeface="ＭＳ Ｐゴシック" charset="0"/>
-                <a:cs typeface="ＭＳ Ｐゴシック" charset="0"/>
-              </a:defRPr>
-            </a:lvl1pPr>
-            <a:lvl2pPr marL="37931725" indent="-37474525" eaLnBrk="0" hangingPunct="0">
-              <a:defRPr sz="2400">
-                <a:solidFill>
-                  <a:schemeClr val="tx1"/>
-                </a:solidFill>
-                <a:latin typeface="Arial" charset="0"/>
-                <a:ea typeface="ＭＳ Ｐゴシック" charset="0"/>
-              </a:defRPr>
-            </a:lvl2pPr>
-            <a:lvl3pPr eaLnBrk="0" hangingPunct="0">
-              <a:defRPr sz="2400">
-                <a:solidFill>
-                  <a:schemeClr val="tx1"/>
-                </a:solidFill>
-                <a:latin typeface="Arial" charset="0"/>
-                <a:ea typeface="ＭＳ Ｐゴシック" charset="0"/>
-              </a:defRPr>
-            </a:lvl3pPr>
-            <a:lvl4pPr eaLnBrk="0" hangingPunct="0">
-              <a:defRPr sz="2400">
-                <a:solidFill>
-                  <a:schemeClr val="tx1"/>
-                </a:solidFill>
-                <a:latin typeface="Arial" charset="0"/>
-                <a:ea typeface="ＭＳ Ｐゴシック" charset="0"/>
-              </a:defRPr>
-            </a:lvl4pPr>
-            <a:lvl5pPr eaLnBrk="0" hangingPunct="0">
-              <a:defRPr sz="2400">
-                <a:solidFill>
-                  <a:schemeClr val="tx1"/>
-                </a:solidFill>
-                <a:latin typeface="Arial" charset="0"/>
-                <a:ea typeface="ＭＳ Ｐゴシック" charset="0"/>
-              </a:defRPr>
-            </a:lvl5pPr>
-            <a:lvl6pPr marL="457200" eaLnBrk="0" fontAlgn="base" hangingPunct="0">
-              <a:spcBef>
-                <a:spcPct val="0"/>
-              </a:spcBef>
-              <a:spcAft>
-                <a:spcPct val="0"/>
-              </a:spcAft>
-              <a:defRPr sz="2400">
-                <a:solidFill>
-                  <a:schemeClr val="tx1"/>
-                </a:solidFill>
-                <a:latin typeface="Arial" charset="0"/>
-                <a:ea typeface="ＭＳ Ｐゴシック" charset="0"/>
-              </a:defRPr>
-            </a:lvl6pPr>
-            <a:lvl7pPr marL="914400" eaLnBrk="0" fontAlgn="base" hangingPunct="0">
-              <a:spcBef>
-                <a:spcPct val="0"/>
-              </a:spcBef>
-              <a:spcAft>
-                <a:spcPct val="0"/>
-              </a:spcAft>
-              <a:defRPr sz="2400">
-                <a:solidFill>
-                  <a:schemeClr val="tx1"/>
-                </a:solidFill>
-                <a:latin typeface="Arial" charset="0"/>
-                <a:ea typeface="ＭＳ Ｐゴシック" charset="0"/>
-              </a:defRPr>
-            </a:lvl7pPr>
-            <a:lvl8pPr marL="1371600" eaLnBrk="0" fontAlgn="base" hangingPunct="0">
-              <a:spcBef>
-                <a:spcPct val="0"/>
-              </a:spcBef>
-              <a:spcAft>
-                <a:spcPct val="0"/>
-              </a:spcAft>
-              <a:defRPr sz="2400">
-                <a:solidFill>
-                  <a:schemeClr val="tx1"/>
-                </a:solidFill>
-                <a:latin typeface="Arial" charset="0"/>
-                <a:ea typeface="ＭＳ Ｐゴシック" charset="0"/>
-              </a:defRPr>
-            </a:lvl8pPr>
-            <a:lvl9pPr marL="1828800" eaLnBrk="0" fontAlgn="base" hangingPunct="0">
-              <a:spcBef>
-                <a:spcPct val="0"/>
-              </a:spcBef>
-              <a:spcAft>
-                <a:spcPct val="0"/>
-              </a:spcAft>
-              <a:defRPr sz="2400">
-                <a:solidFill>
-                  <a:schemeClr val="tx1"/>
-                </a:solidFill>
-                <a:latin typeface="Arial" charset="0"/>
-                <a:ea typeface="ＭＳ Ｐゴシック" charset="0"/>
-              </a:defRPr>
-            </a:lvl9pPr>
-          </a:lstStyle>
-          <a:p>
-            <a:pPr algn="r" eaLnBrk="1" hangingPunct="1">
-              <a:defRPr/>
-            </a:pPr>
-            <a:r>
-              <a:rPr lang="en-US" sz="1600" b="1">
-                <a:cs typeface="Arial" charset="0"/>
-              </a:rPr>
-              <a:t>http://meetings.cshl.edu/</a:t>
-            </a:r>
-            <a:endParaRPr lang="en-US" sz="1600">
-              <a:cs typeface="Arial" charset="0"/>
-            </a:endParaRPr>
-          </a:p>
-        </p:txBody>
-      </p:sp>
-      <p:sp>
-        <p:nvSpPr>
           <p:cNvPr id="2" name="Title 1"/>
           <p:cNvSpPr>
             <a:spLocks noGrp="1"/>
@@ -5266,350 +4922,6 @@
       </p:grpSpPr>
       <p:sp>
         <p:nvSpPr>
-          <p:cNvPr id="3" name="Rectangle 2"/>
-          <p:cNvSpPr/>
-          <p:nvPr userDrawn="1"/>
-        </p:nvSpPr>
-        <p:spPr>
-          <a:xfrm>
-            <a:off x="0" y="6400800"/>
-            <a:ext cx="9144000" cy="457200"/>
-          </a:xfrm>
-          <a:prstGeom prst="rect">
-            <a:avLst/>
-          </a:prstGeom>
-          <a:solidFill>
-            <a:srgbClr val="CA0000"/>
-          </a:solidFill>
-          <a:ln>
-            <a:noFill/>
-          </a:ln>
-        </p:spPr>
-        <p:style>
-          <a:lnRef idx="2">
-            <a:schemeClr val="accent1">
-              <a:shade val="50000"/>
-            </a:schemeClr>
-          </a:lnRef>
-          <a:fillRef idx="1">
-            <a:schemeClr val="accent1"/>
-          </a:fillRef>
-          <a:effectRef idx="0">
-            <a:schemeClr val="accent1"/>
-          </a:effectRef>
-          <a:fontRef idx="minor">
-            <a:schemeClr val="lt1"/>
-          </a:fontRef>
-        </p:style>
-        <p:txBody>
-          <a:bodyPr anchor="ctr"/>
-          <a:lstStyle/>
-          <a:p>
-            <a:pPr algn="ctr">
-              <a:defRPr/>
-            </a:pPr>
-            <a:endParaRPr lang="en-US" sz="1800">
-              <a:solidFill>
-                <a:srgbClr val="FFFFFF"/>
-              </a:solidFill>
-              <a:latin typeface="Segoe UI" charset="0"/>
-              <a:ea typeface="ＭＳ Ｐゴシック" charset="0"/>
-              <a:cs typeface="ＭＳ Ｐゴシック" charset="0"/>
-            </a:endParaRPr>
-          </a:p>
-        </p:txBody>
-      </p:sp>
-      <p:sp>
-        <p:nvSpPr>
-          <p:cNvPr id="4" name="TextBox 3"/>
-          <p:cNvSpPr txBox="1"/>
-          <p:nvPr userDrawn="1"/>
-        </p:nvSpPr>
-        <p:spPr>
-          <a:xfrm>
-            <a:off x="76200" y="6429375"/>
-            <a:ext cx="6705600" cy="396875"/>
-          </a:xfrm>
-          <a:prstGeom prst="rect">
-            <a:avLst/>
-          </a:prstGeom>
-          <a:noFill/>
-        </p:spPr>
-        <p:txBody>
-          <a:bodyPr>
-            <a:spAutoFit/>
-          </a:bodyPr>
-          <a:lstStyle>
-            <a:lvl1pPr eaLnBrk="0" hangingPunct="0">
-              <a:defRPr sz="2400">
-                <a:solidFill>
-                  <a:schemeClr val="tx1"/>
-                </a:solidFill>
-                <a:latin typeface="Arial" charset="0"/>
-                <a:ea typeface="ＭＳ Ｐゴシック" charset="0"/>
-                <a:cs typeface="ＭＳ Ｐゴシック" charset="0"/>
-              </a:defRPr>
-            </a:lvl1pPr>
-            <a:lvl2pPr marL="37931725" indent="-37474525" eaLnBrk="0" hangingPunct="0">
-              <a:defRPr sz="2400">
-                <a:solidFill>
-                  <a:schemeClr val="tx1"/>
-                </a:solidFill>
-                <a:latin typeface="Arial" charset="0"/>
-                <a:ea typeface="ＭＳ Ｐゴシック" charset="0"/>
-              </a:defRPr>
-            </a:lvl2pPr>
-            <a:lvl3pPr eaLnBrk="0" hangingPunct="0">
-              <a:defRPr sz="2400">
-                <a:solidFill>
-                  <a:schemeClr val="tx1"/>
-                </a:solidFill>
-                <a:latin typeface="Arial" charset="0"/>
-                <a:ea typeface="ＭＳ Ｐゴシック" charset="0"/>
-              </a:defRPr>
-            </a:lvl3pPr>
-            <a:lvl4pPr eaLnBrk="0" hangingPunct="0">
-              <a:defRPr sz="2400">
-                <a:solidFill>
-                  <a:schemeClr val="tx1"/>
-                </a:solidFill>
-                <a:latin typeface="Arial" charset="0"/>
-                <a:ea typeface="ＭＳ Ｐゴシック" charset="0"/>
-              </a:defRPr>
-            </a:lvl4pPr>
-            <a:lvl5pPr eaLnBrk="0" hangingPunct="0">
-              <a:defRPr sz="2400">
-                <a:solidFill>
-                  <a:schemeClr val="tx1"/>
-                </a:solidFill>
-                <a:latin typeface="Arial" charset="0"/>
-                <a:ea typeface="ＭＳ Ｐゴシック" charset="0"/>
-              </a:defRPr>
-            </a:lvl5pPr>
-            <a:lvl6pPr marL="457200" eaLnBrk="0" fontAlgn="base" hangingPunct="0">
-              <a:spcBef>
-                <a:spcPct val="0"/>
-              </a:spcBef>
-              <a:spcAft>
-                <a:spcPct val="0"/>
-              </a:spcAft>
-              <a:defRPr sz="2400">
-                <a:solidFill>
-                  <a:schemeClr val="tx1"/>
-                </a:solidFill>
-                <a:latin typeface="Arial" charset="0"/>
-                <a:ea typeface="ＭＳ Ｐゴシック" charset="0"/>
-              </a:defRPr>
-            </a:lvl6pPr>
-            <a:lvl7pPr marL="914400" eaLnBrk="0" fontAlgn="base" hangingPunct="0">
-              <a:spcBef>
-                <a:spcPct val="0"/>
-              </a:spcBef>
-              <a:spcAft>
-                <a:spcPct val="0"/>
-              </a:spcAft>
-              <a:defRPr sz="2400">
-                <a:solidFill>
-                  <a:schemeClr val="tx1"/>
-                </a:solidFill>
-                <a:latin typeface="Arial" charset="0"/>
-                <a:ea typeface="ＭＳ Ｐゴシック" charset="0"/>
-              </a:defRPr>
-            </a:lvl7pPr>
-            <a:lvl8pPr marL="1371600" eaLnBrk="0" fontAlgn="base" hangingPunct="0">
-              <a:spcBef>
-                <a:spcPct val="0"/>
-              </a:spcBef>
-              <a:spcAft>
-                <a:spcPct val="0"/>
-              </a:spcAft>
-              <a:defRPr sz="2400">
-                <a:solidFill>
-                  <a:schemeClr val="tx1"/>
-                </a:solidFill>
-                <a:latin typeface="Arial" charset="0"/>
-                <a:ea typeface="ＭＳ Ｐゴシック" charset="0"/>
-              </a:defRPr>
-            </a:lvl8pPr>
-            <a:lvl9pPr marL="1828800" eaLnBrk="0" fontAlgn="base" hangingPunct="0">
-              <a:spcBef>
-                <a:spcPct val="0"/>
-              </a:spcBef>
-              <a:spcAft>
-                <a:spcPct val="0"/>
-              </a:spcAft>
-              <a:defRPr sz="2400">
-                <a:solidFill>
-                  <a:schemeClr val="tx1"/>
-                </a:solidFill>
-                <a:latin typeface="Arial" charset="0"/>
-                <a:ea typeface="ＭＳ Ｐゴシック" charset="0"/>
-              </a:defRPr>
-            </a:lvl9pPr>
-          </a:lstStyle>
-          <a:p>
-            <a:pPr eaLnBrk="1" hangingPunct="1">
-              <a:defRPr/>
-            </a:pPr>
-            <a:r>
-              <a:rPr lang="en-US" sz="2000" b="1">
-                <a:solidFill>
-                  <a:schemeClr val="bg1"/>
-                </a:solidFill>
-                <a:latin typeface="Calibri" charset="0"/>
-                <a:cs typeface="Calibri" charset="0"/>
-              </a:rPr>
-              <a:t>RNA sequencing and analysis</a:t>
-            </a:r>
-          </a:p>
-        </p:txBody>
-      </p:sp>
-      <p:sp>
-        <p:nvSpPr>
-          <p:cNvPr id="5" name="TextBox 4"/>
-          <p:cNvSpPr txBox="1"/>
-          <p:nvPr userDrawn="1"/>
-        </p:nvSpPr>
-        <p:spPr>
-          <a:xfrm>
-            <a:off x="6172200" y="6477000"/>
-            <a:ext cx="2895600" cy="338138"/>
-          </a:xfrm>
-          <a:prstGeom prst="rect">
-            <a:avLst/>
-          </a:prstGeom>
-          <a:noFill/>
-        </p:spPr>
-        <p:txBody>
-          <a:bodyPr>
-            <a:spAutoFit/>
-          </a:bodyPr>
-          <a:lstStyle>
-            <a:lvl1pPr eaLnBrk="0" hangingPunct="0">
-              <a:defRPr sz="2400">
-                <a:solidFill>
-                  <a:schemeClr val="tx1"/>
-                </a:solidFill>
-                <a:latin typeface="Arial" charset="0"/>
-                <a:ea typeface="ＭＳ Ｐゴシック" charset="0"/>
-                <a:cs typeface="ＭＳ Ｐゴシック" charset="0"/>
-              </a:defRPr>
-            </a:lvl1pPr>
-            <a:lvl2pPr marL="37931725" indent="-37474525" eaLnBrk="0" hangingPunct="0">
-              <a:defRPr sz="2400">
-                <a:solidFill>
-                  <a:schemeClr val="tx1"/>
-                </a:solidFill>
-                <a:latin typeface="Arial" charset="0"/>
-                <a:ea typeface="ＭＳ Ｐゴシック" charset="0"/>
-              </a:defRPr>
-            </a:lvl2pPr>
-            <a:lvl3pPr eaLnBrk="0" hangingPunct="0">
-              <a:defRPr sz="2400">
-                <a:solidFill>
-                  <a:schemeClr val="tx1"/>
-                </a:solidFill>
-                <a:latin typeface="Arial" charset="0"/>
-                <a:ea typeface="ＭＳ Ｐゴシック" charset="0"/>
-              </a:defRPr>
-            </a:lvl3pPr>
-            <a:lvl4pPr eaLnBrk="0" hangingPunct="0">
-              <a:defRPr sz="2400">
-                <a:solidFill>
-                  <a:schemeClr val="tx1"/>
-                </a:solidFill>
-                <a:latin typeface="Arial" charset="0"/>
-                <a:ea typeface="ＭＳ Ｐゴシック" charset="0"/>
-              </a:defRPr>
-            </a:lvl4pPr>
-            <a:lvl5pPr eaLnBrk="0" hangingPunct="0">
-              <a:defRPr sz="2400">
-                <a:solidFill>
-                  <a:schemeClr val="tx1"/>
-                </a:solidFill>
-                <a:latin typeface="Arial" charset="0"/>
-                <a:ea typeface="ＭＳ Ｐゴシック" charset="0"/>
-              </a:defRPr>
-            </a:lvl5pPr>
-            <a:lvl6pPr marL="457200" eaLnBrk="0" fontAlgn="base" hangingPunct="0">
-              <a:spcBef>
-                <a:spcPct val="0"/>
-              </a:spcBef>
-              <a:spcAft>
-                <a:spcPct val="0"/>
-              </a:spcAft>
-              <a:defRPr sz="2400">
-                <a:solidFill>
-                  <a:schemeClr val="tx1"/>
-                </a:solidFill>
-                <a:latin typeface="Arial" charset="0"/>
-                <a:ea typeface="ＭＳ Ｐゴシック" charset="0"/>
-              </a:defRPr>
-            </a:lvl6pPr>
-            <a:lvl7pPr marL="914400" eaLnBrk="0" fontAlgn="base" hangingPunct="0">
-              <a:spcBef>
-                <a:spcPct val="0"/>
-              </a:spcBef>
-              <a:spcAft>
-                <a:spcPct val="0"/>
-              </a:spcAft>
-              <a:defRPr sz="2400">
-                <a:solidFill>
-                  <a:schemeClr val="tx1"/>
-                </a:solidFill>
-                <a:latin typeface="Arial" charset="0"/>
-                <a:ea typeface="ＭＳ Ｐゴシック" charset="0"/>
-              </a:defRPr>
-            </a:lvl7pPr>
-            <a:lvl8pPr marL="1371600" eaLnBrk="0" fontAlgn="base" hangingPunct="0">
-              <a:spcBef>
-                <a:spcPct val="0"/>
-              </a:spcBef>
-              <a:spcAft>
-                <a:spcPct val="0"/>
-              </a:spcAft>
-              <a:defRPr sz="2400">
-                <a:solidFill>
-                  <a:schemeClr val="tx1"/>
-                </a:solidFill>
-                <a:latin typeface="Arial" charset="0"/>
-                <a:ea typeface="ＭＳ Ｐゴシック" charset="0"/>
-              </a:defRPr>
-            </a:lvl8pPr>
-            <a:lvl9pPr marL="1828800" eaLnBrk="0" fontAlgn="base" hangingPunct="0">
-              <a:spcBef>
-                <a:spcPct val="0"/>
-              </a:spcBef>
-              <a:spcAft>
-                <a:spcPct val="0"/>
-              </a:spcAft>
-              <a:defRPr sz="2400">
-                <a:solidFill>
-                  <a:schemeClr val="tx1"/>
-                </a:solidFill>
-                <a:latin typeface="Arial" charset="0"/>
-                <a:ea typeface="ＭＳ Ｐゴシック" charset="0"/>
-              </a:defRPr>
-            </a:lvl9pPr>
-          </a:lstStyle>
-          <a:p>
-            <a:pPr algn="r" eaLnBrk="1" hangingPunct="1">
-              <a:defRPr/>
-            </a:pPr>
-            <a:r>
-              <a:rPr lang="en-US" sz="1600" b="1">
-                <a:cs typeface="Arial" charset="0"/>
-              </a:rPr>
-              <a:t>http://meetings.cshl.edu/</a:t>
-            </a:r>
-            <a:endParaRPr lang="en-US" sz="1600">
-              <a:cs typeface="Arial" charset="0"/>
-            </a:endParaRPr>
-          </a:p>
-        </p:txBody>
-      </p:sp>
-      <p:sp>
-        <p:nvSpPr>
           <p:cNvPr id="2" name="Title 1"/>
           <p:cNvSpPr>
             <a:spLocks noGrp="1"/>
@@ -5674,350 +4986,6 @@
       </p:grpSpPr>
       <p:sp>
         <p:nvSpPr>
-          <p:cNvPr id="5" name="Rectangle 4"/>
-          <p:cNvSpPr/>
-          <p:nvPr userDrawn="1"/>
-        </p:nvSpPr>
-        <p:spPr>
-          <a:xfrm>
-            <a:off x="0" y="6400800"/>
-            <a:ext cx="9144000" cy="457200"/>
-          </a:xfrm>
-          <a:prstGeom prst="rect">
-            <a:avLst/>
-          </a:prstGeom>
-          <a:solidFill>
-            <a:srgbClr val="CA0000"/>
-          </a:solidFill>
-          <a:ln>
-            <a:noFill/>
-          </a:ln>
-        </p:spPr>
-        <p:style>
-          <a:lnRef idx="2">
-            <a:schemeClr val="accent1">
-              <a:shade val="50000"/>
-            </a:schemeClr>
-          </a:lnRef>
-          <a:fillRef idx="1">
-            <a:schemeClr val="accent1"/>
-          </a:fillRef>
-          <a:effectRef idx="0">
-            <a:schemeClr val="accent1"/>
-          </a:effectRef>
-          <a:fontRef idx="minor">
-            <a:schemeClr val="lt1"/>
-          </a:fontRef>
-        </p:style>
-        <p:txBody>
-          <a:bodyPr anchor="ctr"/>
-          <a:lstStyle/>
-          <a:p>
-            <a:pPr algn="ctr">
-              <a:defRPr/>
-            </a:pPr>
-            <a:endParaRPr lang="en-US" sz="1800">
-              <a:solidFill>
-                <a:srgbClr val="FFFFFF"/>
-              </a:solidFill>
-              <a:latin typeface="Segoe UI" charset="0"/>
-              <a:ea typeface="ＭＳ Ｐゴシック" charset="0"/>
-              <a:cs typeface="ＭＳ Ｐゴシック" charset="0"/>
-            </a:endParaRPr>
-          </a:p>
-        </p:txBody>
-      </p:sp>
-      <p:sp>
-        <p:nvSpPr>
-          <p:cNvPr id="7" name="TextBox 6"/>
-          <p:cNvSpPr txBox="1"/>
-          <p:nvPr userDrawn="1"/>
-        </p:nvSpPr>
-        <p:spPr>
-          <a:xfrm>
-            <a:off x="76200" y="6429375"/>
-            <a:ext cx="6705600" cy="400050"/>
-          </a:xfrm>
-          <a:prstGeom prst="rect">
-            <a:avLst/>
-          </a:prstGeom>
-          <a:noFill/>
-        </p:spPr>
-        <p:txBody>
-          <a:bodyPr>
-            <a:spAutoFit/>
-          </a:bodyPr>
-          <a:lstStyle>
-            <a:lvl1pPr eaLnBrk="0" hangingPunct="0">
-              <a:defRPr sz="2400">
-                <a:solidFill>
-                  <a:schemeClr val="tx1"/>
-                </a:solidFill>
-                <a:latin typeface="Arial" charset="0"/>
-                <a:ea typeface="ＭＳ Ｐゴシック" charset="0"/>
-                <a:cs typeface="ＭＳ Ｐゴシック" charset="0"/>
-              </a:defRPr>
-            </a:lvl1pPr>
-            <a:lvl2pPr marL="37931725" indent="-37474525" eaLnBrk="0" hangingPunct="0">
-              <a:defRPr sz="2400">
-                <a:solidFill>
-                  <a:schemeClr val="tx1"/>
-                </a:solidFill>
-                <a:latin typeface="Arial" charset="0"/>
-                <a:ea typeface="ＭＳ Ｐゴシック" charset="0"/>
-              </a:defRPr>
-            </a:lvl2pPr>
-            <a:lvl3pPr eaLnBrk="0" hangingPunct="0">
-              <a:defRPr sz="2400">
-                <a:solidFill>
-                  <a:schemeClr val="tx1"/>
-                </a:solidFill>
-                <a:latin typeface="Arial" charset="0"/>
-                <a:ea typeface="ＭＳ Ｐゴシック" charset="0"/>
-              </a:defRPr>
-            </a:lvl3pPr>
-            <a:lvl4pPr eaLnBrk="0" hangingPunct="0">
-              <a:defRPr sz="2400">
-                <a:solidFill>
-                  <a:schemeClr val="tx1"/>
-                </a:solidFill>
-                <a:latin typeface="Arial" charset="0"/>
-                <a:ea typeface="ＭＳ Ｐゴシック" charset="0"/>
-              </a:defRPr>
-            </a:lvl4pPr>
-            <a:lvl5pPr eaLnBrk="0" hangingPunct="0">
-              <a:defRPr sz="2400">
-                <a:solidFill>
-                  <a:schemeClr val="tx1"/>
-                </a:solidFill>
-                <a:latin typeface="Arial" charset="0"/>
-                <a:ea typeface="ＭＳ Ｐゴシック" charset="0"/>
-              </a:defRPr>
-            </a:lvl5pPr>
-            <a:lvl6pPr marL="457200" eaLnBrk="0" fontAlgn="base" hangingPunct="0">
-              <a:spcBef>
-                <a:spcPct val="0"/>
-              </a:spcBef>
-              <a:spcAft>
-                <a:spcPct val="0"/>
-              </a:spcAft>
-              <a:defRPr sz="2400">
-                <a:solidFill>
-                  <a:schemeClr val="tx1"/>
-                </a:solidFill>
-                <a:latin typeface="Arial" charset="0"/>
-                <a:ea typeface="ＭＳ Ｐゴシック" charset="0"/>
-              </a:defRPr>
-            </a:lvl6pPr>
-            <a:lvl7pPr marL="914400" eaLnBrk="0" fontAlgn="base" hangingPunct="0">
-              <a:spcBef>
-                <a:spcPct val="0"/>
-              </a:spcBef>
-              <a:spcAft>
-                <a:spcPct val="0"/>
-              </a:spcAft>
-              <a:defRPr sz="2400">
-                <a:solidFill>
-                  <a:schemeClr val="tx1"/>
-                </a:solidFill>
-                <a:latin typeface="Arial" charset="0"/>
-                <a:ea typeface="ＭＳ Ｐゴシック" charset="0"/>
-              </a:defRPr>
-            </a:lvl7pPr>
-            <a:lvl8pPr marL="1371600" eaLnBrk="0" fontAlgn="base" hangingPunct="0">
-              <a:spcBef>
-                <a:spcPct val="0"/>
-              </a:spcBef>
-              <a:spcAft>
-                <a:spcPct val="0"/>
-              </a:spcAft>
-              <a:defRPr sz="2400">
-                <a:solidFill>
-                  <a:schemeClr val="tx1"/>
-                </a:solidFill>
-                <a:latin typeface="Arial" charset="0"/>
-                <a:ea typeface="ＭＳ Ｐゴシック" charset="0"/>
-              </a:defRPr>
-            </a:lvl8pPr>
-            <a:lvl9pPr marL="1828800" eaLnBrk="0" fontAlgn="base" hangingPunct="0">
-              <a:spcBef>
-                <a:spcPct val="0"/>
-              </a:spcBef>
-              <a:spcAft>
-                <a:spcPct val="0"/>
-              </a:spcAft>
-              <a:defRPr sz="2400">
-                <a:solidFill>
-                  <a:schemeClr val="tx1"/>
-                </a:solidFill>
-                <a:latin typeface="Arial" charset="0"/>
-                <a:ea typeface="ＭＳ Ｐゴシック" charset="0"/>
-              </a:defRPr>
-            </a:lvl9pPr>
-          </a:lstStyle>
-          <a:p>
-            <a:pPr eaLnBrk="1" hangingPunct="1">
-              <a:defRPr/>
-            </a:pPr>
-            <a:r>
-              <a:rPr lang="en-US" sz="2000" b="1">
-                <a:solidFill>
-                  <a:schemeClr val="bg1"/>
-                </a:solidFill>
-                <a:latin typeface="Calibri" charset="0"/>
-                <a:cs typeface="Calibri" charset="0"/>
-              </a:rPr>
-              <a:t>RNA sequencing and analysis</a:t>
-            </a:r>
-          </a:p>
-        </p:txBody>
-      </p:sp>
-      <p:sp>
-        <p:nvSpPr>
-          <p:cNvPr id="8" name="TextBox 7"/>
-          <p:cNvSpPr txBox="1"/>
-          <p:nvPr userDrawn="1"/>
-        </p:nvSpPr>
-        <p:spPr>
-          <a:xfrm>
-            <a:off x="6172200" y="6477000"/>
-            <a:ext cx="2895600" cy="338138"/>
-          </a:xfrm>
-          <a:prstGeom prst="rect">
-            <a:avLst/>
-          </a:prstGeom>
-          <a:noFill/>
-        </p:spPr>
-        <p:txBody>
-          <a:bodyPr>
-            <a:spAutoFit/>
-          </a:bodyPr>
-          <a:lstStyle>
-            <a:lvl1pPr eaLnBrk="0" hangingPunct="0">
-              <a:defRPr sz="2400">
-                <a:solidFill>
-                  <a:schemeClr val="tx1"/>
-                </a:solidFill>
-                <a:latin typeface="Arial" charset="0"/>
-                <a:ea typeface="ＭＳ Ｐゴシック" charset="0"/>
-                <a:cs typeface="ＭＳ Ｐゴシック" charset="0"/>
-              </a:defRPr>
-            </a:lvl1pPr>
-            <a:lvl2pPr marL="37931725" indent="-37474525" eaLnBrk="0" hangingPunct="0">
-              <a:defRPr sz="2400">
-                <a:solidFill>
-                  <a:schemeClr val="tx1"/>
-                </a:solidFill>
-                <a:latin typeface="Arial" charset="0"/>
-                <a:ea typeface="ＭＳ Ｐゴシック" charset="0"/>
-              </a:defRPr>
-            </a:lvl2pPr>
-            <a:lvl3pPr eaLnBrk="0" hangingPunct="0">
-              <a:defRPr sz="2400">
-                <a:solidFill>
-                  <a:schemeClr val="tx1"/>
-                </a:solidFill>
-                <a:latin typeface="Arial" charset="0"/>
-                <a:ea typeface="ＭＳ Ｐゴシック" charset="0"/>
-              </a:defRPr>
-            </a:lvl3pPr>
-            <a:lvl4pPr eaLnBrk="0" hangingPunct="0">
-              <a:defRPr sz="2400">
-                <a:solidFill>
-                  <a:schemeClr val="tx1"/>
-                </a:solidFill>
-                <a:latin typeface="Arial" charset="0"/>
-                <a:ea typeface="ＭＳ Ｐゴシック" charset="0"/>
-              </a:defRPr>
-            </a:lvl4pPr>
-            <a:lvl5pPr eaLnBrk="0" hangingPunct="0">
-              <a:defRPr sz="2400">
-                <a:solidFill>
-                  <a:schemeClr val="tx1"/>
-                </a:solidFill>
-                <a:latin typeface="Arial" charset="0"/>
-                <a:ea typeface="ＭＳ Ｐゴシック" charset="0"/>
-              </a:defRPr>
-            </a:lvl5pPr>
-            <a:lvl6pPr marL="457200" eaLnBrk="0" fontAlgn="base" hangingPunct="0">
-              <a:spcBef>
-                <a:spcPct val="0"/>
-              </a:spcBef>
-              <a:spcAft>
-                <a:spcPct val="0"/>
-              </a:spcAft>
-              <a:defRPr sz="2400">
-                <a:solidFill>
-                  <a:schemeClr val="tx1"/>
-                </a:solidFill>
-                <a:latin typeface="Arial" charset="0"/>
-                <a:ea typeface="ＭＳ Ｐゴシック" charset="0"/>
-              </a:defRPr>
-            </a:lvl6pPr>
-            <a:lvl7pPr marL="914400" eaLnBrk="0" fontAlgn="base" hangingPunct="0">
-              <a:spcBef>
-                <a:spcPct val="0"/>
-              </a:spcBef>
-              <a:spcAft>
-                <a:spcPct val="0"/>
-              </a:spcAft>
-              <a:defRPr sz="2400">
-                <a:solidFill>
-                  <a:schemeClr val="tx1"/>
-                </a:solidFill>
-                <a:latin typeface="Arial" charset="0"/>
-                <a:ea typeface="ＭＳ Ｐゴシック" charset="0"/>
-              </a:defRPr>
-            </a:lvl7pPr>
-            <a:lvl8pPr marL="1371600" eaLnBrk="0" fontAlgn="base" hangingPunct="0">
-              <a:spcBef>
-                <a:spcPct val="0"/>
-              </a:spcBef>
-              <a:spcAft>
-                <a:spcPct val="0"/>
-              </a:spcAft>
-              <a:defRPr sz="2400">
-                <a:solidFill>
-                  <a:schemeClr val="tx1"/>
-                </a:solidFill>
-                <a:latin typeface="Arial" charset="0"/>
-                <a:ea typeface="ＭＳ Ｐゴシック" charset="0"/>
-              </a:defRPr>
-            </a:lvl8pPr>
-            <a:lvl9pPr marL="1828800" eaLnBrk="0" fontAlgn="base" hangingPunct="0">
-              <a:spcBef>
-                <a:spcPct val="0"/>
-              </a:spcBef>
-              <a:spcAft>
-                <a:spcPct val="0"/>
-              </a:spcAft>
-              <a:defRPr sz="2400">
-                <a:solidFill>
-                  <a:schemeClr val="tx1"/>
-                </a:solidFill>
-                <a:latin typeface="Arial" charset="0"/>
-                <a:ea typeface="ＭＳ Ｐゴシック" charset="0"/>
-              </a:defRPr>
-            </a:lvl9pPr>
-          </a:lstStyle>
-          <a:p>
-            <a:pPr algn="r" eaLnBrk="1" hangingPunct="1">
-              <a:defRPr/>
-            </a:pPr>
-            <a:r>
-              <a:rPr lang="en-US" sz="1600" b="1">
-                <a:cs typeface="Arial" charset="0"/>
-              </a:rPr>
-              <a:t>http://meetings.cshl.edu/</a:t>
-            </a:r>
-            <a:endParaRPr lang="en-US" sz="1600">
-              <a:cs typeface="Arial" charset="0"/>
-            </a:endParaRPr>
-          </a:p>
-        </p:txBody>
-      </p:sp>
-      <p:sp>
-        <p:nvSpPr>
           <p:cNvPr id="2" name="Title 1"/>
           <p:cNvSpPr>
             <a:spLocks noGrp="1"/>
@@ -6254,350 +5222,6 @@
           <a:chExt cx="0" cy="0"/>
         </a:xfrm>
       </p:grpSpPr>
-      <p:sp>
-        <p:nvSpPr>
-          <p:cNvPr id="4" name="Rectangle 3"/>
-          <p:cNvSpPr/>
-          <p:nvPr userDrawn="1"/>
-        </p:nvSpPr>
-        <p:spPr>
-          <a:xfrm>
-            <a:off x="0" y="6400800"/>
-            <a:ext cx="9144000" cy="457200"/>
-          </a:xfrm>
-          <a:prstGeom prst="rect">
-            <a:avLst/>
-          </a:prstGeom>
-          <a:solidFill>
-            <a:srgbClr val="CA0000"/>
-          </a:solidFill>
-          <a:ln>
-            <a:noFill/>
-          </a:ln>
-        </p:spPr>
-        <p:style>
-          <a:lnRef idx="2">
-            <a:schemeClr val="accent1">
-              <a:shade val="50000"/>
-            </a:schemeClr>
-          </a:lnRef>
-          <a:fillRef idx="1">
-            <a:schemeClr val="accent1"/>
-          </a:fillRef>
-          <a:effectRef idx="0">
-            <a:schemeClr val="accent1"/>
-          </a:effectRef>
-          <a:fontRef idx="minor">
-            <a:schemeClr val="lt1"/>
-          </a:fontRef>
-        </p:style>
-        <p:txBody>
-          <a:bodyPr anchor="ctr"/>
-          <a:lstStyle/>
-          <a:p>
-            <a:pPr algn="ctr">
-              <a:defRPr/>
-            </a:pPr>
-            <a:endParaRPr lang="en-US" sz="1800">
-              <a:solidFill>
-                <a:srgbClr val="FFFFFF"/>
-              </a:solidFill>
-              <a:latin typeface="Segoe UI" charset="0"/>
-              <a:ea typeface="ＭＳ Ｐゴシック" charset="0"/>
-              <a:cs typeface="ＭＳ Ｐゴシック" charset="0"/>
-            </a:endParaRPr>
-          </a:p>
-        </p:txBody>
-      </p:sp>
-      <p:sp>
-        <p:nvSpPr>
-          <p:cNvPr id="5" name="TextBox 4"/>
-          <p:cNvSpPr txBox="1"/>
-          <p:nvPr userDrawn="1"/>
-        </p:nvSpPr>
-        <p:spPr>
-          <a:xfrm>
-            <a:off x="76200" y="6429375"/>
-            <a:ext cx="6705600" cy="400050"/>
-          </a:xfrm>
-          <a:prstGeom prst="rect">
-            <a:avLst/>
-          </a:prstGeom>
-          <a:noFill/>
-        </p:spPr>
-        <p:txBody>
-          <a:bodyPr>
-            <a:spAutoFit/>
-          </a:bodyPr>
-          <a:lstStyle>
-            <a:lvl1pPr eaLnBrk="0" hangingPunct="0">
-              <a:defRPr sz="2400">
-                <a:solidFill>
-                  <a:schemeClr val="tx1"/>
-                </a:solidFill>
-                <a:latin typeface="Arial" charset="0"/>
-                <a:ea typeface="ＭＳ Ｐゴシック" charset="0"/>
-                <a:cs typeface="ＭＳ Ｐゴシック" charset="0"/>
-              </a:defRPr>
-            </a:lvl1pPr>
-            <a:lvl2pPr marL="37931725" indent="-37474525" eaLnBrk="0" hangingPunct="0">
-              <a:defRPr sz="2400">
-                <a:solidFill>
-                  <a:schemeClr val="tx1"/>
-                </a:solidFill>
-                <a:latin typeface="Arial" charset="0"/>
-                <a:ea typeface="ＭＳ Ｐゴシック" charset="0"/>
-              </a:defRPr>
-            </a:lvl2pPr>
-            <a:lvl3pPr eaLnBrk="0" hangingPunct="0">
-              <a:defRPr sz="2400">
-                <a:solidFill>
-                  <a:schemeClr val="tx1"/>
-                </a:solidFill>
-                <a:latin typeface="Arial" charset="0"/>
-                <a:ea typeface="ＭＳ Ｐゴシック" charset="0"/>
-              </a:defRPr>
-            </a:lvl3pPr>
-            <a:lvl4pPr eaLnBrk="0" hangingPunct="0">
-              <a:defRPr sz="2400">
-                <a:solidFill>
-                  <a:schemeClr val="tx1"/>
-                </a:solidFill>
-                <a:latin typeface="Arial" charset="0"/>
-                <a:ea typeface="ＭＳ Ｐゴシック" charset="0"/>
-              </a:defRPr>
-            </a:lvl4pPr>
-            <a:lvl5pPr eaLnBrk="0" hangingPunct="0">
-              <a:defRPr sz="2400">
-                <a:solidFill>
-                  <a:schemeClr val="tx1"/>
-                </a:solidFill>
-                <a:latin typeface="Arial" charset="0"/>
-                <a:ea typeface="ＭＳ Ｐゴシック" charset="0"/>
-              </a:defRPr>
-            </a:lvl5pPr>
-            <a:lvl6pPr marL="457200" eaLnBrk="0" fontAlgn="base" hangingPunct="0">
-              <a:spcBef>
-                <a:spcPct val="0"/>
-              </a:spcBef>
-              <a:spcAft>
-                <a:spcPct val="0"/>
-              </a:spcAft>
-              <a:defRPr sz="2400">
-                <a:solidFill>
-                  <a:schemeClr val="tx1"/>
-                </a:solidFill>
-                <a:latin typeface="Arial" charset="0"/>
-                <a:ea typeface="ＭＳ Ｐゴシック" charset="0"/>
-              </a:defRPr>
-            </a:lvl6pPr>
-            <a:lvl7pPr marL="914400" eaLnBrk="0" fontAlgn="base" hangingPunct="0">
-              <a:spcBef>
-                <a:spcPct val="0"/>
-              </a:spcBef>
-              <a:spcAft>
-                <a:spcPct val="0"/>
-              </a:spcAft>
-              <a:defRPr sz="2400">
-                <a:solidFill>
-                  <a:schemeClr val="tx1"/>
-                </a:solidFill>
-                <a:latin typeface="Arial" charset="0"/>
-                <a:ea typeface="ＭＳ Ｐゴシック" charset="0"/>
-              </a:defRPr>
-            </a:lvl7pPr>
-            <a:lvl8pPr marL="1371600" eaLnBrk="0" fontAlgn="base" hangingPunct="0">
-              <a:spcBef>
-                <a:spcPct val="0"/>
-              </a:spcBef>
-              <a:spcAft>
-                <a:spcPct val="0"/>
-              </a:spcAft>
-              <a:defRPr sz="2400">
-                <a:solidFill>
-                  <a:schemeClr val="tx1"/>
-                </a:solidFill>
-                <a:latin typeface="Arial" charset="0"/>
-                <a:ea typeface="ＭＳ Ｐゴシック" charset="0"/>
-              </a:defRPr>
-            </a:lvl8pPr>
-            <a:lvl9pPr marL="1828800" eaLnBrk="0" fontAlgn="base" hangingPunct="0">
-              <a:spcBef>
-                <a:spcPct val="0"/>
-              </a:spcBef>
-              <a:spcAft>
-                <a:spcPct val="0"/>
-              </a:spcAft>
-              <a:defRPr sz="2400">
-                <a:solidFill>
-                  <a:schemeClr val="tx1"/>
-                </a:solidFill>
-                <a:latin typeface="Arial" charset="0"/>
-                <a:ea typeface="ＭＳ Ｐゴシック" charset="0"/>
-              </a:defRPr>
-            </a:lvl9pPr>
-          </a:lstStyle>
-          <a:p>
-            <a:pPr eaLnBrk="1" hangingPunct="1">
-              <a:defRPr/>
-            </a:pPr>
-            <a:r>
-              <a:rPr lang="en-US" sz="2000" b="1">
-                <a:solidFill>
-                  <a:schemeClr val="bg1"/>
-                </a:solidFill>
-                <a:latin typeface="Calibri" charset="0"/>
-                <a:cs typeface="Calibri" charset="0"/>
-              </a:rPr>
-              <a:t>RNA sequencing and analysis</a:t>
-            </a:r>
-          </a:p>
-        </p:txBody>
-      </p:sp>
-      <p:sp>
-        <p:nvSpPr>
-          <p:cNvPr id="6" name="TextBox 5"/>
-          <p:cNvSpPr txBox="1"/>
-          <p:nvPr userDrawn="1"/>
-        </p:nvSpPr>
-        <p:spPr>
-          <a:xfrm>
-            <a:off x="6172200" y="6477000"/>
-            <a:ext cx="2895600" cy="338138"/>
-          </a:xfrm>
-          <a:prstGeom prst="rect">
-            <a:avLst/>
-          </a:prstGeom>
-          <a:noFill/>
-        </p:spPr>
-        <p:txBody>
-          <a:bodyPr>
-            <a:spAutoFit/>
-          </a:bodyPr>
-          <a:lstStyle>
-            <a:lvl1pPr eaLnBrk="0" hangingPunct="0">
-              <a:defRPr sz="2400">
-                <a:solidFill>
-                  <a:schemeClr val="tx1"/>
-                </a:solidFill>
-                <a:latin typeface="Arial" charset="0"/>
-                <a:ea typeface="ＭＳ Ｐゴシック" charset="0"/>
-                <a:cs typeface="ＭＳ Ｐゴシック" charset="0"/>
-              </a:defRPr>
-            </a:lvl1pPr>
-            <a:lvl2pPr marL="37931725" indent="-37474525" eaLnBrk="0" hangingPunct="0">
-              <a:defRPr sz="2400">
-                <a:solidFill>
-                  <a:schemeClr val="tx1"/>
-                </a:solidFill>
-                <a:latin typeface="Arial" charset="0"/>
-                <a:ea typeface="ＭＳ Ｐゴシック" charset="0"/>
-              </a:defRPr>
-            </a:lvl2pPr>
-            <a:lvl3pPr eaLnBrk="0" hangingPunct="0">
-              <a:defRPr sz="2400">
-                <a:solidFill>
-                  <a:schemeClr val="tx1"/>
-                </a:solidFill>
-                <a:latin typeface="Arial" charset="0"/>
-                <a:ea typeface="ＭＳ Ｐゴシック" charset="0"/>
-              </a:defRPr>
-            </a:lvl3pPr>
-            <a:lvl4pPr eaLnBrk="0" hangingPunct="0">
-              <a:defRPr sz="2400">
-                <a:solidFill>
-                  <a:schemeClr val="tx1"/>
-                </a:solidFill>
-                <a:latin typeface="Arial" charset="0"/>
-                <a:ea typeface="ＭＳ Ｐゴシック" charset="0"/>
-              </a:defRPr>
-            </a:lvl4pPr>
-            <a:lvl5pPr eaLnBrk="0" hangingPunct="0">
-              <a:defRPr sz="2400">
-                <a:solidFill>
-                  <a:schemeClr val="tx1"/>
-                </a:solidFill>
-                <a:latin typeface="Arial" charset="0"/>
-                <a:ea typeface="ＭＳ Ｐゴシック" charset="0"/>
-              </a:defRPr>
-            </a:lvl5pPr>
-            <a:lvl6pPr marL="457200" eaLnBrk="0" fontAlgn="base" hangingPunct="0">
-              <a:spcBef>
-                <a:spcPct val="0"/>
-              </a:spcBef>
-              <a:spcAft>
-                <a:spcPct val="0"/>
-              </a:spcAft>
-              <a:defRPr sz="2400">
-                <a:solidFill>
-                  <a:schemeClr val="tx1"/>
-                </a:solidFill>
-                <a:latin typeface="Arial" charset="0"/>
-                <a:ea typeface="ＭＳ Ｐゴシック" charset="0"/>
-              </a:defRPr>
-            </a:lvl6pPr>
-            <a:lvl7pPr marL="914400" eaLnBrk="0" fontAlgn="base" hangingPunct="0">
-              <a:spcBef>
-                <a:spcPct val="0"/>
-              </a:spcBef>
-              <a:spcAft>
-                <a:spcPct val="0"/>
-              </a:spcAft>
-              <a:defRPr sz="2400">
-                <a:solidFill>
-                  <a:schemeClr val="tx1"/>
-                </a:solidFill>
-                <a:latin typeface="Arial" charset="0"/>
-                <a:ea typeface="ＭＳ Ｐゴシック" charset="0"/>
-              </a:defRPr>
-            </a:lvl7pPr>
-            <a:lvl8pPr marL="1371600" eaLnBrk="0" fontAlgn="base" hangingPunct="0">
-              <a:spcBef>
-                <a:spcPct val="0"/>
-              </a:spcBef>
-              <a:spcAft>
-                <a:spcPct val="0"/>
-              </a:spcAft>
-              <a:defRPr sz="2400">
-                <a:solidFill>
-                  <a:schemeClr val="tx1"/>
-                </a:solidFill>
-                <a:latin typeface="Arial" charset="0"/>
-                <a:ea typeface="ＭＳ Ｐゴシック" charset="0"/>
-              </a:defRPr>
-            </a:lvl8pPr>
-            <a:lvl9pPr marL="1828800" eaLnBrk="0" fontAlgn="base" hangingPunct="0">
-              <a:spcBef>
-                <a:spcPct val="0"/>
-              </a:spcBef>
-              <a:spcAft>
-                <a:spcPct val="0"/>
-              </a:spcAft>
-              <a:defRPr sz="2400">
-                <a:solidFill>
-                  <a:schemeClr val="tx1"/>
-                </a:solidFill>
-                <a:latin typeface="Arial" charset="0"/>
-                <a:ea typeface="ＭＳ Ｐゴシック" charset="0"/>
-              </a:defRPr>
-            </a:lvl9pPr>
-          </a:lstStyle>
-          <a:p>
-            <a:pPr algn="r" eaLnBrk="1" hangingPunct="1">
-              <a:defRPr/>
-            </a:pPr>
-            <a:r>
-              <a:rPr lang="en-US" sz="1600" b="1">
-                <a:cs typeface="Arial" charset="0"/>
-              </a:rPr>
-              <a:t>http://meetings.cshl.edu/</a:t>
-            </a:r>
-            <a:endParaRPr lang="en-US" sz="1600">
-              <a:cs typeface="Arial" charset="0"/>
-            </a:endParaRPr>
-          </a:p>
-        </p:txBody>
-      </p:sp>
       <p:sp>
         <p:nvSpPr>
           <p:cNvPr id="3" name="Content Placeholder 2"/>
@@ -6872,144 +5496,386 @@
       </p:sp>
       <p:sp>
         <p:nvSpPr>
-          <p:cNvPr id="4" name="Date Placeholder 3"/>
-          <p:cNvSpPr>
-            <a:spLocks noGrp="1"/>
-          </p:cNvSpPr>
-          <p:nvPr>
-            <p:ph type="dt" sz="half" idx="2"/>
-          </p:nvPr>
+          <p:cNvPr id="7" name="Rectangle 6">
+            <a:extLst>
+              <a:ext uri="{FF2B5EF4-FFF2-40B4-BE49-F238E27FC236}">
+                <a16:creationId xmlns:a16="http://schemas.microsoft.com/office/drawing/2014/main" id="{27B7DF51-25E2-564D-8057-DB6C2111625C}"/>
+              </a:ext>
+            </a:extLst>
+          </p:cNvPr>
+          <p:cNvSpPr/>
+          <p:nvPr userDrawn="1"/>
         </p:nvSpPr>
         <p:spPr>
           <a:xfrm>
-            <a:off x="457200" y="6356350"/>
-            <a:ext cx="2133600" cy="365125"/>
+            <a:off x="0" y="6400800"/>
+            <a:ext cx="9144000" cy="457200"/>
           </a:xfrm>
           <a:prstGeom prst="rect">
             <a:avLst/>
           </a:prstGeom>
+          <a:solidFill>
+            <a:srgbClr val="9A3334"/>
+          </a:solidFill>
+          <a:ln>
+            <a:noFill/>
+          </a:ln>
         </p:spPr>
+        <p:style>
+          <a:lnRef idx="2">
+            <a:schemeClr val="accent1">
+              <a:shade val="50000"/>
+            </a:schemeClr>
+          </a:lnRef>
+          <a:fillRef idx="1">
+            <a:schemeClr val="accent1"/>
+          </a:fillRef>
+          <a:effectRef idx="0">
+            <a:schemeClr val="accent1"/>
+          </a:effectRef>
+          <a:fontRef idx="minor">
+            <a:schemeClr val="lt1"/>
+          </a:fontRef>
+        </p:style>
         <p:txBody>
-          <a:bodyPr vert="horz" wrap="square" lIns="91440" tIns="45720" rIns="91440" bIns="45720" numCol="1" anchor="ctr" anchorCtr="0" compatLnSpc="1">
-            <a:prstTxWarp prst="textNoShape">
-              <a:avLst/>
-            </a:prstTxWarp>
-          </a:bodyPr>
-          <a:lstStyle>
-            <a:lvl1pPr>
-              <a:defRPr sz="1200">
-                <a:solidFill>
-                  <a:srgbClr val="898989"/>
-                </a:solidFill>
-                <a:latin typeface="Segoe UI" charset="0"/>
-              </a:defRPr>
-            </a:lvl1pPr>
-          </a:lstStyle>
-          <a:p>
-            <a:pPr>
+          <a:bodyPr anchor="ctr"/>
+          <a:lstStyle/>
+          <a:p>
+            <a:pPr algn="ctr" fontAlgn="auto">
+              <a:spcBef>
+                <a:spcPts val="0"/>
+              </a:spcBef>
+              <a:spcAft>
+                <a:spcPts val="0"/>
+              </a:spcAft>
               <a:defRPr/>
             </a:pPr>
-            <a:fld id="{CF3FDDA8-DFE2-794D-9469-18250F189BBE}" type="datetime1">
-              <a:rPr lang="en-US"/>
-              <a:pPr>
-                <a:defRPr/>
-              </a:pPr>
-              <a:t>11/10/19</a:t>
-            </a:fld>
-            <a:endParaRPr lang="en-US"/>
+            <a:endParaRPr lang="en-US" sz="1350"/>
           </a:p>
         </p:txBody>
       </p:sp>
       <p:sp>
         <p:nvSpPr>
-          <p:cNvPr id="5" name="Footer Placeholder 4"/>
-          <p:cNvSpPr>
-            <a:spLocks noGrp="1"/>
+          <p:cNvPr id="8" name="TextBox 7">
+            <a:extLst>
+              <a:ext uri="{FF2B5EF4-FFF2-40B4-BE49-F238E27FC236}">
+                <a16:creationId xmlns:a16="http://schemas.microsoft.com/office/drawing/2014/main" id="{473743DF-32DF-D54C-90EB-6EF2F3E014B2}"/>
+              </a:ext>
+            </a:extLst>
+          </p:cNvPr>
+          <p:cNvSpPr txBox="1">
+            <a:spLocks noChangeArrowheads="1"/>
           </p:cNvSpPr>
-          <p:nvPr>
-            <p:ph type="ftr" sz="quarter" idx="3"/>
-          </p:nvPr>
+          <p:nvPr userDrawn="1"/>
         </p:nvSpPr>
-        <p:spPr>
+        <p:spPr bwMode="auto">
           <a:xfrm>
-            <a:off x="3124200" y="6356350"/>
-            <a:ext cx="2895600" cy="365125"/>
+            <a:off x="170656" y="6461446"/>
+            <a:ext cx="6705600" cy="323165"/>
           </a:xfrm>
           <a:prstGeom prst="rect">
             <a:avLst/>
           </a:prstGeom>
+          <a:noFill/>
+          <a:ln>
+            <a:noFill/>
+          </a:ln>
+          <a:extLst>
+            <a:ext uri="{909E8E84-426E-40dd-AFC4-6F175D3DCCD1}">
+              <a14:hiddenFill xmlns:a14="http://schemas.microsoft.com/office/drawing/2010/main" xmlns="">
+                <a:solidFill>
+                  <a:srgbClr val="FFFFFF"/>
+                </a:solidFill>
+              </a14:hiddenFill>
+            </a:ext>
+            <a:ext uri="{91240B29-F687-4f45-9708-019B960494DF}">
+              <a14:hiddenLine xmlns:a14="http://schemas.microsoft.com/office/drawing/2010/main" xmlns="" w="9525">
+                <a:solidFill>
+                  <a:srgbClr val="000000"/>
+                </a:solidFill>
+                <a:miter lim="800000"/>
+                <a:headEnd/>
+                <a:tailEnd/>
+              </a14:hiddenLine>
+            </a:ext>
+          </a:extLst>
         </p:spPr>
         <p:txBody>
-          <a:bodyPr vert="horz" wrap="square" lIns="91440" tIns="45720" rIns="91440" bIns="45720" numCol="1" anchor="ctr" anchorCtr="0" compatLnSpc="1">
-            <a:prstTxWarp prst="textNoShape">
-              <a:avLst/>
-            </a:prstTxWarp>
+          <a:bodyPr>
+            <a:spAutoFit/>
           </a:bodyPr>
           <a:lstStyle>
-            <a:lvl1pPr algn="ctr">
-              <a:defRPr sz="1200">
-                <a:solidFill>
-                  <a:srgbClr val="898989"/>
-                </a:solidFill>
-                <a:latin typeface="Segoe UI" charset="0"/>
+            <a:lvl1pPr eaLnBrk="0" hangingPunct="0">
+              <a:defRPr sz="2400">
+                <a:solidFill>
+                  <a:schemeClr val="tx1"/>
+                </a:solidFill>
+                <a:latin typeface="Arial" charset="0"/>
+                <a:ea typeface="ＭＳ Ｐゴシック" charset="0"/>
+                <a:cs typeface="ＭＳ Ｐゴシック" charset="0"/>
               </a:defRPr>
             </a:lvl1pPr>
+            <a:lvl2pPr marL="742950" indent="-285750" eaLnBrk="0" hangingPunct="0">
+              <a:defRPr sz="2400">
+                <a:solidFill>
+                  <a:schemeClr val="tx1"/>
+                </a:solidFill>
+                <a:latin typeface="Arial" charset="0"/>
+                <a:ea typeface="ＭＳ Ｐゴシック" charset="0"/>
+              </a:defRPr>
+            </a:lvl2pPr>
+            <a:lvl3pPr marL="1143000" indent="-228600" eaLnBrk="0" hangingPunct="0">
+              <a:defRPr sz="2400">
+                <a:solidFill>
+                  <a:schemeClr val="tx1"/>
+                </a:solidFill>
+                <a:latin typeface="Arial" charset="0"/>
+                <a:ea typeface="ＭＳ Ｐゴシック" charset="0"/>
+              </a:defRPr>
+            </a:lvl3pPr>
+            <a:lvl4pPr marL="1600200" indent="-228600" eaLnBrk="0" hangingPunct="0">
+              <a:defRPr sz="2400">
+                <a:solidFill>
+                  <a:schemeClr val="tx1"/>
+                </a:solidFill>
+                <a:latin typeface="Arial" charset="0"/>
+                <a:ea typeface="ＭＳ Ｐゴシック" charset="0"/>
+              </a:defRPr>
+            </a:lvl4pPr>
+            <a:lvl5pPr marL="2057400" indent="-228600" eaLnBrk="0" hangingPunct="0">
+              <a:defRPr sz="2400">
+                <a:solidFill>
+                  <a:schemeClr val="tx1"/>
+                </a:solidFill>
+                <a:latin typeface="Arial" charset="0"/>
+                <a:ea typeface="ＭＳ Ｐゴシック" charset="0"/>
+              </a:defRPr>
+            </a:lvl5pPr>
+            <a:lvl6pPr marL="2514600" indent="-228600" eaLnBrk="0" fontAlgn="base" hangingPunct="0">
+              <a:spcBef>
+                <a:spcPct val="0"/>
+              </a:spcBef>
+              <a:spcAft>
+                <a:spcPct val="0"/>
+              </a:spcAft>
+              <a:defRPr sz="2400">
+                <a:solidFill>
+                  <a:schemeClr val="tx1"/>
+                </a:solidFill>
+                <a:latin typeface="Arial" charset="0"/>
+                <a:ea typeface="ＭＳ Ｐゴシック" charset="0"/>
+              </a:defRPr>
+            </a:lvl6pPr>
+            <a:lvl7pPr marL="2971800" indent="-228600" eaLnBrk="0" fontAlgn="base" hangingPunct="0">
+              <a:spcBef>
+                <a:spcPct val="0"/>
+              </a:spcBef>
+              <a:spcAft>
+                <a:spcPct val="0"/>
+              </a:spcAft>
+              <a:defRPr sz="2400">
+                <a:solidFill>
+                  <a:schemeClr val="tx1"/>
+                </a:solidFill>
+                <a:latin typeface="Arial" charset="0"/>
+                <a:ea typeface="ＭＳ Ｐゴシック" charset="0"/>
+              </a:defRPr>
+            </a:lvl7pPr>
+            <a:lvl8pPr marL="3429000" indent="-228600" eaLnBrk="0" fontAlgn="base" hangingPunct="0">
+              <a:spcBef>
+                <a:spcPct val="0"/>
+              </a:spcBef>
+              <a:spcAft>
+                <a:spcPct val="0"/>
+              </a:spcAft>
+              <a:defRPr sz="2400">
+                <a:solidFill>
+                  <a:schemeClr val="tx1"/>
+                </a:solidFill>
+                <a:latin typeface="Arial" charset="0"/>
+                <a:ea typeface="ＭＳ Ｐゴシック" charset="0"/>
+              </a:defRPr>
+            </a:lvl8pPr>
+            <a:lvl9pPr marL="3886200" indent="-228600" eaLnBrk="0" fontAlgn="base" hangingPunct="0">
+              <a:spcBef>
+                <a:spcPct val="0"/>
+              </a:spcBef>
+              <a:spcAft>
+                <a:spcPct val="0"/>
+              </a:spcAft>
+              <a:defRPr sz="2400">
+                <a:solidFill>
+                  <a:schemeClr val="tx1"/>
+                </a:solidFill>
+                <a:latin typeface="Arial" charset="0"/>
+                <a:ea typeface="ＭＳ Ｐゴシック" charset="0"/>
+              </a:defRPr>
+            </a:lvl9pPr>
           </a:lstStyle>
           <a:p>
-            <a:pPr>
+            <a:pPr eaLnBrk="1" hangingPunct="1">
               <a:defRPr/>
             </a:pPr>
-            <a:endParaRPr lang="en-US"/>
+            <a:r>
+              <a:rPr lang="en-US" sz="1500" b="1" dirty="0">
+                <a:solidFill>
+                  <a:schemeClr val="bg1"/>
+                </a:solidFill>
+                <a:latin typeface="Calibri" charset="0"/>
+                <a:cs typeface="Calibri" charset="0"/>
+              </a:rPr>
+              <a:t>Module 0</a:t>
+            </a:r>
           </a:p>
         </p:txBody>
       </p:sp>
       <p:sp>
         <p:nvSpPr>
-          <p:cNvPr id="6" name="Slide Number Placeholder 5"/>
-          <p:cNvSpPr>
-            <a:spLocks noGrp="1"/>
-          </p:cNvSpPr>
-          <p:nvPr>
-            <p:ph type="sldNum" sz="quarter" idx="4"/>
-          </p:nvPr>
+          <p:cNvPr id="9" name="TextBox 8">
+            <a:extLst>
+              <a:ext uri="{FF2B5EF4-FFF2-40B4-BE49-F238E27FC236}">
+                <a16:creationId xmlns:a16="http://schemas.microsoft.com/office/drawing/2014/main" id="{54426666-B110-8F4A-A20A-2D2E4085E084}"/>
+              </a:ext>
+            </a:extLst>
+          </p:cNvPr>
+          <p:cNvSpPr txBox="1"/>
+          <p:nvPr userDrawn="1"/>
         </p:nvSpPr>
         <p:spPr>
           <a:xfrm>
-            <a:off x="6553200" y="6356350"/>
-            <a:ext cx="2133600" cy="365125"/>
+            <a:off x="6602288" y="6451602"/>
+            <a:ext cx="2362200" cy="369332"/>
           </a:xfrm>
           <a:prstGeom prst="rect">
             <a:avLst/>
           </a:prstGeom>
+          <a:noFill/>
         </p:spPr>
         <p:txBody>
-          <a:bodyPr vert="horz" wrap="square" lIns="91440" tIns="45720" rIns="91440" bIns="45720" numCol="1" anchor="ctr" anchorCtr="0" compatLnSpc="1">
-            <a:prstTxWarp prst="textNoShape">
-              <a:avLst/>
-            </a:prstTxWarp>
+          <a:bodyPr>
+            <a:spAutoFit/>
           </a:bodyPr>
           <a:lstStyle>
-            <a:lvl1pPr algn="r">
-              <a:defRPr sz="1200">
-                <a:solidFill>
-                  <a:srgbClr val="898989"/>
-                </a:solidFill>
-                <a:latin typeface="Segoe UI" charset="0"/>
+            <a:lvl1pPr eaLnBrk="0" hangingPunct="0">
+              <a:defRPr sz="2400">
+                <a:solidFill>
+                  <a:schemeClr val="tx1"/>
+                </a:solidFill>
+                <a:latin typeface="Arial" charset="0"/>
+                <a:ea typeface="ＭＳ Ｐゴシック" charset="0"/>
+                <a:cs typeface="ＭＳ Ｐゴシック" charset="0"/>
               </a:defRPr>
             </a:lvl1pPr>
+            <a:lvl2pPr marL="37931725" indent="-37474525" eaLnBrk="0" hangingPunct="0">
+              <a:defRPr sz="2400">
+                <a:solidFill>
+                  <a:schemeClr val="tx1"/>
+                </a:solidFill>
+                <a:latin typeface="Arial" charset="0"/>
+                <a:ea typeface="ＭＳ Ｐゴシック" charset="0"/>
+              </a:defRPr>
+            </a:lvl2pPr>
+            <a:lvl3pPr eaLnBrk="0" hangingPunct="0">
+              <a:defRPr sz="2400">
+                <a:solidFill>
+                  <a:schemeClr val="tx1"/>
+                </a:solidFill>
+                <a:latin typeface="Arial" charset="0"/>
+                <a:ea typeface="ＭＳ Ｐゴシック" charset="0"/>
+              </a:defRPr>
+            </a:lvl3pPr>
+            <a:lvl4pPr eaLnBrk="0" hangingPunct="0">
+              <a:defRPr sz="2400">
+                <a:solidFill>
+                  <a:schemeClr val="tx1"/>
+                </a:solidFill>
+                <a:latin typeface="Arial" charset="0"/>
+                <a:ea typeface="ＭＳ Ｐゴシック" charset="0"/>
+              </a:defRPr>
+            </a:lvl4pPr>
+            <a:lvl5pPr eaLnBrk="0" hangingPunct="0">
+              <a:defRPr sz="2400">
+                <a:solidFill>
+                  <a:schemeClr val="tx1"/>
+                </a:solidFill>
+                <a:latin typeface="Arial" charset="0"/>
+                <a:ea typeface="ＭＳ Ｐゴシック" charset="0"/>
+              </a:defRPr>
+            </a:lvl5pPr>
+            <a:lvl6pPr marL="457200" eaLnBrk="0" fontAlgn="base" hangingPunct="0">
+              <a:spcBef>
+                <a:spcPct val="0"/>
+              </a:spcBef>
+              <a:spcAft>
+                <a:spcPct val="0"/>
+              </a:spcAft>
+              <a:defRPr sz="2400">
+                <a:solidFill>
+                  <a:schemeClr val="tx1"/>
+                </a:solidFill>
+                <a:latin typeface="Arial" charset="0"/>
+                <a:ea typeface="ＭＳ Ｐゴシック" charset="0"/>
+              </a:defRPr>
+            </a:lvl6pPr>
+            <a:lvl7pPr marL="914400" eaLnBrk="0" fontAlgn="base" hangingPunct="0">
+              <a:spcBef>
+                <a:spcPct val="0"/>
+              </a:spcBef>
+              <a:spcAft>
+                <a:spcPct val="0"/>
+              </a:spcAft>
+              <a:defRPr sz="2400">
+                <a:solidFill>
+                  <a:schemeClr val="tx1"/>
+                </a:solidFill>
+                <a:latin typeface="Arial" charset="0"/>
+                <a:ea typeface="ＭＳ Ｐゴシック" charset="0"/>
+              </a:defRPr>
+            </a:lvl7pPr>
+            <a:lvl8pPr marL="1371600" eaLnBrk="0" fontAlgn="base" hangingPunct="0">
+              <a:spcBef>
+                <a:spcPct val="0"/>
+              </a:spcBef>
+              <a:spcAft>
+                <a:spcPct val="0"/>
+              </a:spcAft>
+              <a:defRPr sz="2400">
+                <a:solidFill>
+                  <a:schemeClr val="tx1"/>
+                </a:solidFill>
+                <a:latin typeface="Arial" charset="0"/>
+                <a:ea typeface="ＭＳ Ｐゴシック" charset="0"/>
+              </a:defRPr>
+            </a:lvl8pPr>
+            <a:lvl9pPr marL="1828800" eaLnBrk="0" fontAlgn="base" hangingPunct="0">
+              <a:spcBef>
+                <a:spcPct val="0"/>
+              </a:spcBef>
+              <a:spcAft>
+                <a:spcPct val="0"/>
+              </a:spcAft>
+              <a:defRPr sz="2400">
+                <a:solidFill>
+                  <a:schemeClr val="tx1"/>
+                </a:solidFill>
+                <a:latin typeface="Arial" charset="0"/>
+                <a:ea typeface="ＭＳ Ｐゴシック" charset="0"/>
+              </a:defRPr>
+            </a:lvl9pPr>
           </a:lstStyle>
           <a:p>
-            <a:pPr>
+            <a:pPr algn="r" eaLnBrk="1" hangingPunct="1">
               <a:defRPr/>
             </a:pPr>
-            <a:fld id="{D133E7D2-33FF-EC4A-AE37-9A522B04AD5B}" type="slidenum">
-              <a:rPr lang="en-US"/>
-              <a:pPr>
-                <a:defRPr/>
-              </a:pPr>
-              <a:t>‹#›</a:t>
-            </a:fld>
-            <a:endParaRPr lang="en-US"/>
+            <a:r>
+              <a:rPr lang="en-US" sz="1800" b="1" dirty="0">
+                <a:cs typeface="Arial" charset="0"/>
+              </a:rPr>
+              <a:t>rnabio.org</a:t>
+            </a:r>
+            <a:endParaRPr lang="en-US" sz="1800" dirty="0">
+              <a:cs typeface="Arial" charset="0"/>
+            </a:endParaRPr>
           </a:p>
         </p:txBody>
       </p:sp>
@@ -7453,7 +6319,7 @@
         <p:spPr>
           <a:xfrm>
             <a:off x="0" y="2522834"/>
-            <a:ext cx="9144000" cy="4335166"/>
+            <a:ext cx="9144000" cy="3889541"/>
           </a:xfrm>
           <a:prstGeom prst="rect">
             <a:avLst/>
@@ -7871,7 +6737,7 @@
         </p:blipFill>
         <p:spPr bwMode="auto">
           <a:xfrm>
-            <a:off x="6804248" y="3886007"/>
+            <a:off x="6804248" y="3489115"/>
             <a:ext cx="2224143" cy="1931151"/>
           </a:xfrm>
           <a:prstGeom prst="rect">
@@ -7924,7 +6790,7 @@
         </p:blipFill>
         <p:spPr>
           <a:xfrm>
-            <a:off x="155872" y="3287167"/>
+            <a:off x="155872" y="2890275"/>
             <a:ext cx="3128830" cy="3128830"/>
           </a:xfrm>
           <a:prstGeom prst="rect">
@@ -7961,7 +6827,7 @@
         </p:blipFill>
         <p:spPr bwMode="auto">
           <a:xfrm>
-            <a:off x="3408807" y="3284984"/>
+            <a:off x="3408807" y="2888092"/>
             <a:ext cx="3271336" cy="3133196"/>
           </a:xfrm>
           <a:prstGeom prst="rect">

</xml_diff>

<commit_message>
update to wide format
</commit_message>
<xml_diff>
--- a/assets/lectures/cshl/2019/full/RNASeq_Module0_IntrotoRNA.pptx
+++ b/assets/lectures/cshl/2019/full/RNASeq_Module0_IntrotoRNA.pptx
@@ -38,7 +38,7 @@
     <p:sldId id="537" r:id="rId26"/>
     <p:sldId id="538" r:id="rId27"/>
   </p:sldIdLst>
-  <p:sldSz cx="9144000" cy="6858000" type="screen4x3"/>
+  <p:sldSz cx="12192000" cy="6858000"/>
   <p:notesSz cx="7315200" cy="9601200"/>
   <p:defaultTextStyle>
     <a:defPPr>
@@ -168,12 +168,12 @@
   <p:extLst>
     <p:ext uri="{EFAFB233-063F-42B5-8137-9DF3F51BA10A}">
       <p15:sldGuideLst xmlns:p15="http://schemas.microsoft.com/office/powerpoint/2012/main">
-        <p15:guide id="1" orient="horz" pos="2160">
+        <p15:guide id="1" orient="horz" pos="2160" userDrawn="1">
           <p15:clr>
             <a:srgbClr val="A4A3A4"/>
           </p15:clr>
         </p15:guide>
-        <p15:guide id="2" pos="2880">
+        <p15:guide id="2" pos="3840" userDrawn="1">
           <p15:clr>
             <a:srgbClr val="A4A3A4"/>
           </p15:clr>
@@ -512,8 +512,8 @@
         </p:nvSpPr>
         <p:spPr>
           <a:xfrm>
-            <a:off x="1257300" y="720725"/>
-            <a:ext cx="4800600" cy="3600450"/>
+            <a:off x="457200" y="720725"/>
+            <a:ext cx="6400800" cy="3600450"/>
           </a:xfrm>
           <a:prstGeom prst="rect">
             <a:avLst/>
@@ -850,6 +850,10 @@
           </p:nvPr>
         </p:nvSpPr>
         <p:spPr bwMode="auto">
+          <a:xfrm>
+            <a:off x="457200" y="720725"/>
+            <a:ext cx="6400800" cy="3600450"/>
+          </a:xfrm>
           <a:noFill/>
           <a:ln>
             <a:solidFill>
@@ -1274,6 +1278,10 @@
           </p:nvPr>
         </p:nvSpPr>
         <p:spPr bwMode="auto">
+          <a:xfrm>
+            <a:off x="457200" y="720725"/>
+            <a:ext cx="6400800" cy="3600450"/>
+          </a:xfrm>
           <a:solidFill>
             <a:srgbClr val="FFFFFF"/>
           </a:solidFill>
@@ -1530,6 +1538,10 @@
           </p:nvPr>
         </p:nvSpPr>
         <p:spPr bwMode="auto">
+          <a:xfrm>
+            <a:off x="457200" y="720725"/>
+            <a:ext cx="6400800" cy="3600450"/>
+          </a:xfrm>
           <a:solidFill>
             <a:srgbClr val="FFFFFF"/>
           </a:solidFill>
@@ -1786,6 +1798,10 @@
           </p:nvPr>
         </p:nvSpPr>
         <p:spPr bwMode="auto">
+          <a:xfrm>
+            <a:off x="457200" y="720725"/>
+            <a:ext cx="6400800" cy="3600450"/>
+          </a:xfrm>
           <a:solidFill>
             <a:srgbClr val="FFFFFF"/>
           </a:solidFill>
@@ -2042,6 +2058,10 @@
           </p:nvPr>
         </p:nvSpPr>
         <p:spPr bwMode="auto">
+          <a:xfrm>
+            <a:off x="457200" y="720725"/>
+            <a:ext cx="6400800" cy="3600450"/>
+          </a:xfrm>
           <a:solidFill>
             <a:srgbClr val="FFFFFF"/>
           </a:solidFill>
@@ -2298,6 +2318,10 @@
           </p:nvPr>
         </p:nvSpPr>
         <p:spPr bwMode="auto">
+          <a:xfrm>
+            <a:off x="457200" y="720725"/>
+            <a:ext cx="6400800" cy="3600450"/>
+          </a:xfrm>
           <a:solidFill>
             <a:srgbClr val="FFFFFF"/>
           </a:solidFill>
@@ -2554,6 +2578,10 @@
           </p:nvPr>
         </p:nvSpPr>
         <p:spPr bwMode="auto">
+          <a:xfrm>
+            <a:off x="457200" y="720725"/>
+            <a:ext cx="6400800" cy="3600450"/>
+          </a:xfrm>
           <a:solidFill>
             <a:srgbClr val="FFFFFF"/>
           </a:solidFill>
@@ -2810,6 +2838,10 @@
           </p:nvPr>
         </p:nvSpPr>
         <p:spPr bwMode="auto">
+          <a:xfrm>
+            <a:off x="457200" y="720725"/>
+            <a:ext cx="6400800" cy="3600450"/>
+          </a:xfrm>
           <a:solidFill>
             <a:srgbClr val="FFFFFF"/>
           </a:solidFill>
@@ -3173,6 +3205,10 @@
           </p:nvPr>
         </p:nvSpPr>
         <p:spPr bwMode="auto">
+          <a:xfrm>
+            <a:off x="457200" y="720725"/>
+            <a:ext cx="6400800" cy="3600450"/>
+          </a:xfrm>
           <a:solidFill>
             <a:srgbClr val="FFFFFF"/>
           </a:solidFill>
@@ -3429,6 +3465,10 @@
           </p:nvPr>
         </p:nvSpPr>
         <p:spPr bwMode="auto">
+          <a:xfrm>
+            <a:off x="457200" y="720725"/>
+            <a:ext cx="6400800" cy="3600450"/>
+          </a:xfrm>
           <a:solidFill>
             <a:srgbClr val="FFFFFF"/>
           </a:solidFill>
@@ -3685,6 +3725,10 @@
           </p:nvPr>
         </p:nvSpPr>
         <p:spPr bwMode="auto">
+          <a:xfrm>
+            <a:off x="457200" y="720725"/>
+            <a:ext cx="6400800" cy="3600450"/>
+          </a:xfrm>
           <a:solidFill>
             <a:srgbClr val="FFFFFF"/>
           </a:solidFill>
@@ -3783,7 +3827,12 @@
             <p:ph type="sldImg"/>
           </p:nvPr>
         </p:nvSpPr>
-        <p:spPr/>
+        <p:spPr>
+          <a:xfrm>
+            <a:off x="457200" y="720725"/>
+            <a:ext cx="6400800" cy="3600450"/>
+          </a:xfrm>
+        </p:spPr>
       </p:sp>
       <p:sp>
         <p:nvSpPr>
@@ -3965,7 +4014,12 @@
             <p:ph type="sldImg"/>
           </p:nvPr>
         </p:nvSpPr>
-        <p:spPr/>
+        <p:spPr>
+          <a:xfrm>
+            <a:off x="457200" y="720725"/>
+            <a:ext cx="6400800" cy="3600450"/>
+          </a:xfrm>
+        </p:spPr>
       </p:sp>
       <p:sp>
         <p:nvSpPr>
@@ -4333,7 +4387,12 @@
             <p:ph type="sldImg"/>
           </p:nvPr>
         </p:nvSpPr>
-        <p:spPr/>
+        <p:spPr>
+          <a:xfrm>
+            <a:off x="457200" y="720725"/>
+            <a:ext cx="6400800" cy="3600450"/>
+          </a:xfrm>
+        </p:spPr>
       </p:sp>
       <p:sp>
         <p:nvSpPr>
@@ -4639,7 +4698,7 @@
         <p:spPr>
           <a:xfrm>
             <a:off x="0" y="0"/>
-            <a:ext cx="9144000" cy="2514600"/>
+            <a:ext cx="12192000" cy="2514600"/>
           </a:xfrm>
           <a:prstGeom prst="rect">
             <a:avLst/>
@@ -4708,8 +4767,8 @@
         </p:blipFill>
         <p:spPr bwMode="auto">
           <a:xfrm>
-            <a:off x="300038" y="381000"/>
-            <a:ext cx="3509962" cy="1676400"/>
+            <a:off x="400051" y="381000"/>
+            <a:ext cx="3483441" cy="1247800"/>
           </a:xfrm>
           <a:prstGeom prst="rect">
             <a:avLst/>
@@ -4781,8 +4840,8 @@
         </p:nvSpPr>
         <p:spPr>
           <a:xfrm>
-            <a:off x="152400" y="274638"/>
-            <a:ext cx="8839200" cy="1143000"/>
+            <a:off x="203200" y="274638"/>
+            <a:ext cx="11785600" cy="1143000"/>
           </a:xfrm>
         </p:spPr>
         <p:txBody>
@@ -4815,8 +4874,8 @@
         </p:nvSpPr>
         <p:spPr>
           <a:xfrm>
-            <a:off x="152400" y="1600200"/>
-            <a:ext cx="8839200" cy="4724400"/>
+            <a:off x="203200" y="1600200"/>
+            <a:ext cx="11785600" cy="4724400"/>
           </a:xfrm>
         </p:spPr>
         <p:txBody>
@@ -4932,8 +4991,8 @@
         </p:nvSpPr>
         <p:spPr>
           <a:xfrm>
-            <a:off x="152400" y="274638"/>
-            <a:ext cx="8839200" cy="1143000"/>
+            <a:off x="203200" y="274638"/>
+            <a:ext cx="11785600" cy="1143000"/>
           </a:xfrm>
         </p:spPr>
         <p:txBody>
@@ -4996,8 +5055,8 @@
         </p:nvSpPr>
         <p:spPr>
           <a:xfrm>
-            <a:off x="152400" y="274638"/>
-            <a:ext cx="8839200" cy="1143000"/>
+            <a:off x="203200" y="274638"/>
+            <a:ext cx="11785600" cy="1143000"/>
           </a:xfrm>
         </p:spPr>
         <p:txBody>
@@ -5030,8 +5089,8 @@
         </p:nvSpPr>
         <p:spPr>
           <a:xfrm>
-            <a:off x="152400" y="1600200"/>
-            <a:ext cx="4343400" cy="4724400"/>
+            <a:off x="203200" y="1600200"/>
+            <a:ext cx="5791200" cy="4724400"/>
           </a:xfrm>
         </p:spPr>
         <p:txBody>
@@ -5117,8 +5176,8 @@
         </p:nvSpPr>
         <p:spPr>
           <a:xfrm>
-            <a:off x="4648200" y="1600200"/>
-            <a:ext cx="4343400" cy="4724400"/>
+            <a:off x="6197600" y="1600200"/>
+            <a:ext cx="5791200" cy="4724400"/>
           </a:xfrm>
         </p:spPr>
         <p:txBody>
@@ -5234,8 +5293,8 @@
         </p:nvSpPr>
         <p:spPr>
           <a:xfrm>
-            <a:off x="152400" y="152400"/>
-            <a:ext cx="8839200" cy="6172200"/>
+            <a:off x="203200" y="152400"/>
+            <a:ext cx="11785600" cy="6172200"/>
           </a:xfrm>
         </p:spPr>
         <p:txBody>
@@ -5356,8 +5415,8 @@
         </p:nvSpPr>
         <p:spPr bwMode="auto">
           <a:xfrm>
-            <a:off x="457200" y="274638"/>
-            <a:ext cx="8229600" cy="1143000"/>
+            <a:off x="609600" y="274638"/>
+            <a:ext cx="10972800" cy="1143000"/>
           </a:xfrm>
           <a:prstGeom prst="rect">
             <a:avLst/>
@@ -5417,8 +5476,8 @@
         </p:nvSpPr>
         <p:spPr bwMode="auto">
           <a:xfrm>
-            <a:off x="457200" y="1600200"/>
-            <a:ext cx="8229600" cy="4525963"/>
+            <a:off x="609600" y="1600201"/>
+            <a:ext cx="10972800" cy="4525963"/>
           </a:xfrm>
           <a:prstGeom prst="rect">
             <a:avLst/>
@@ -5509,7 +5568,7 @@
         <p:spPr>
           <a:xfrm>
             <a:off x="0" y="6400800"/>
-            <a:ext cx="9144000" cy="457200"/>
+            <a:ext cx="12192000" cy="457200"/>
           </a:xfrm>
           <a:prstGeom prst="rect">
             <a:avLst/>
@@ -5570,8 +5629,8 @@
         </p:nvSpPr>
         <p:spPr bwMode="auto">
           <a:xfrm>
-            <a:off x="170656" y="6461446"/>
-            <a:ext cx="6705600" cy="323165"/>
+            <a:off x="227541" y="6461447"/>
+            <a:ext cx="8940800" cy="323165"/>
           </a:xfrm>
           <a:prstGeom prst="rect">
             <a:avLst/>
@@ -5743,8 +5802,8 @@
         </p:nvSpPr>
         <p:spPr>
           <a:xfrm>
-            <a:off x="6602288" y="6451602"/>
-            <a:ext cx="2362200" cy="369332"/>
+            <a:off x="8803051" y="6451602"/>
+            <a:ext cx="3149600" cy="369332"/>
           </a:xfrm>
           <a:prstGeom prst="rect">
             <a:avLst/>
@@ -5899,8 +5958,8 @@
         </p:nvSpPr>
         <p:spPr>
           <a:xfrm>
-            <a:off x="4361846" y="6471290"/>
-            <a:ext cx="420308" cy="323165"/>
+            <a:off x="5885847" y="6471291"/>
+            <a:ext cx="420307" cy="323165"/>
           </a:xfrm>
           <a:prstGeom prst="rect">
             <a:avLst/>
@@ -6370,7 +6429,7 @@
         </p:nvSpPr>
         <p:spPr>
           <a:xfrm>
-            <a:off x="0" y="2522834"/>
+            <a:off x="1524000" y="2522835"/>
             <a:ext cx="9144000" cy="3889541"/>
           </a:xfrm>
           <a:prstGeom prst="rect">
@@ -6427,7 +6486,7 @@
         </p:nvSpPr>
         <p:spPr bwMode="auto">
           <a:xfrm>
-            <a:off x="2943225" y="365125"/>
+            <a:off x="5807968" y="183488"/>
             <a:ext cx="6019800" cy="838200"/>
           </a:xfrm>
           <a:prstGeom prst="rect">
@@ -6570,55 +6629,16 @@
           <a:p>
             <a:pPr algn="r" eaLnBrk="1" hangingPunct="1"/>
             <a:r>
-              <a:rPr lang="en-US" sz="2000" dirty="0">
+              <a:rPr lang="en-US" dirty="0">
                 <a:solidFill>
                   <a:schemeClr val="bg1"/>
                 </a:solidFill>
                 <a:latin typeface="Calibri" charset="0"/>
                 <a:cs typeface="Segoe UI" charset="0"/>
               </a:rPr>
-              <a:t>RNA-</a:t>
-            </a:r>
-            <a:r>
-              <a:rPr lang="en-US" sz="2000" dirty="0" err="1">
-                <a:solidFill>
-                  <a:schemeClr val="bg1"/>
-                </a:solidFill>
-                <a:latin typeface="Calibri" charset="0"/>
-                <a:cs typeface="Segoe UI" charset="0"/>
-              </a:rPr>
-              <a:t>Seq</a:t>
-            </a:r>
-            <a:r>
-              <a:rPr lang="en-US" sz="2000" dirty="0">
-                <a:solidFill>
-                  <a:schemeClr val="bg1"/>
-                </a:solidFill>
-                <a:latin typeface="Calibri" charset="0"/>
-                <a:cs typeface="Segoe UI" charset="0"/>
-              </a:rPr>
-              <a:t> Module 1</a:t>
-            </a:r>
-            <a:br>
-              <a:rPr lang="en-US" sz="2000" dirty="0">
-                <a:solidFill>
-                  <a:schemeClr val="bg1"/>
-                </a:solidFill>
-                <a:latin typeface="Calibri" charset="0"/>
-                <a:cs typeface="Segoe UI" charset="0"/>
-              </a:rPr>
-            </a:br>
-            <a:r>
-              <a:rPr lang="en-US" sz="2000" dirty="0">
-                <a:solidFill>
-                  <a:schemeClr val="bg1"/>
-                </a:solidFill>
-                <a:latin typeface="Calibri" charset="0"/>
-                <a:cs typeface="Segoe UI" charset="0"/>
-              </a:rPr>
               <a:t>Introduction to RNA sequencing (lecture)</a:t>
             </a:r>
-            <a:endParaRPr lang="en-US" sz="1800" b="1" dirty="0">
+            <a:endParaRPr lang="en-US" sz="2000" b="1" dirty="0">
               <a:solidFill>
                 <a:schemeClr val="bg1"/>
               </a:solidFill>
@@ -6638,7 +6658,7 @@
         </p:nvSpPr>
         <p:spPr>
           <a:xfrm>
-            <a:off x="3854897" y="1412776"/>
+            <a:off x="6670006" y="1304209"/>
             <a:ext cx="5181599" cy="936104"/>
           </a:xfrm>
           <a:prstGeom prst="rect">
@@ -6706,8 +6726,6 @@
               <a:spcAft>
                 <a:spcPts val="0"/>
               </a:spcAft>
-              <a:buFont typeface="Arial" pitchFamily="34" charset="0"/>
-              <a:buNone/>
               <a:defRPr/>
             </a:pPr>
             <a:r>
@@ -6733,7 +6751,7 @@
               <a:defRPr/>
             </a:pPr>
             <a:r>
-              <a:rPr lang="en-US" sz="1400">
+              <a:rPr lang="en-US" sz="1400" dirty="0">
                 <a:ln w="1270">
                   <a:solidFill>
                     <a:schemeClr val="tx1">
@@ -6746,17 +6764,6 @@
               </a:rPr>
               <a:t>November 5- 16, 2019</a:t>
             </a:r>
-            <a:endParaRPr lang="en-US" sz="1400" dirty="0">
-              <a:ln w="1270">
-                <a:solidFill>
-                  <a:schemeClr val="tx1">
-                    <a:alpha val="38000"/>
-                  </a:schemeClr>
-                </a:solidFill>
-              </a:ln>
-              <a:latin typeface="Calibri"/>
-              <a:cs typeface="Calibri"/>
-            </a:endParaRPr>
           </a:p>
         </p:txBody>
       </p:sp>
@@ -6789,7 +6796,7 @@
         </p:blipFill>
         <p:spPr bwMode="auto">
           <a:xfrm>
-            <a:off x="6804248" y="3489115"/>
+            <a:off x="8328249" y="3489116"/>
             <a:ext cx="2224143" cy="1931151"/>
           </a:xfrm>
           <a:prstGeom prst="rect">
@@ -6842,7 +6849,7 @@
         </p:blipFill>
         <p:spPr>
           <a:xfrm>
-            <a:off x="155872" y="2890275"/>
+            <a:off x="1679872" y="2890275"/>
             <a:ext cx="3128830" cy="3128830"/>
           </a:xfrm>
           <a:prstGeom prst="rect">
@@ -6879,7 +6886,7 @@
         </p:blipFill>
         <p:spPr bwMode="auto">
           <a:xfrm>
-            <a:off x="3408807" y="2888092"/>
+            <a:off x="4932807" y="2888092"/>
             <a:ext cx="3271336" cy="3133196"/>
           </a:xfrm>
           <a:prstGeom prst="rect">
@@ -7135,7 +7142,7 @@
         </p:nvSpPr>
         <p:spPr>
           <a:xfrm>
-            <a:off x="152400" y="44450"/>
+            <a:off x="1676400" y="44450"/>
             <a:ext cx="8839200" cy="1143000"/>
           </a:xfrm>
         </p:spPr>
@@ -7362,7 +7369,7 @@
         </p:blipFill>
         <p:spPr>
           <a:xfrm>
-            <a:off x="899592" y="188640"/>
+            <a:off x="2423592" y="188640"/>
             <a:ext cx="7272808" cy="6133334"/>
           </a:xfrm>
           <a:prstGeom prst="rect">
@@ -7382,7 +7389,7 @@
         </p:nvSpPr>
         <p:spPr>
           <a:xfrm>
-            <a:off x="35496" y="44450"/>
+            <a:off x="1559496" y="44450"/>
             <a:ext cx="3456384" cy="864270"/>
           </a:xfrm>
         </p:spPr>
@@ -7452,7 +7459,7 @@
         </p:blipFill>
         <p:spPr>
           <a:xfrm>
-            <a:off x="251520" y="170605"/>
+            <a:off x="1775520" y="170606"/>
             <a:ext cx="5904656" cy="6138715"/>
           </a:xfrm>
           <a:prstGeom prst="rect">
@@ -7472,7 +7479,7 @@
         </p:nvSpPr>
         <p:spPr>
           <a:xfrm>
-            <a:off x="5652120" y="27692"/>
+            <a:off x="7176120" y="27692"/>
             <a:ext cx="3456384" cy="864270"/>
           </a:xfrm>
         </p:spPr>
@@ -7532,7 +7539,7 @@
         </p:nvSpPr>
         <p:spPr>
           <a:xfrm>
-            <a:off x="6660232" y="0"/>
+            <a:off x="7932711" y="332656"/>
             <a:ext cx="2483768" cy="864270"/>
           </a:xfrm>
         </p:spPr>
@@ -7582,7 +7589,7 @@
         </p:blipFill>
         <p:spPr>
           <a:xfrm>
-            <a:off x="251520" y="1052736"/>
+            <a:off x="1775521" y="1052737"/>
             <a:ext cx="4143053" cy="4468027"/>
           </a:xfrm>
           <a:prstGeom prst="rect">
@@ -7611,7 +7618,7 @@
         </p:blipFill>
         <p:spPr>
           <a:xfrm>
-            <a:off x="4644008" y="2132856"/>
+            <a:off x="6168009" y="2132857"/>
             <a:ext cx="4143053" cy="2361921"/>
           </a:xfrm>
           <a:prstGeom prst="rect">
@@ -7661,7 +7668,7 @@
         </p:nvSpPr>
         <p:spPr>
           <a:xfrm>
-            <a:off x="152400" y="0"/>
+            <a:off x="1676400" y="0"/>
             <a:ext cx="8839200" cy="1143000"/>
           </a:xfrm>
         </p:spPr>
@@ -7691,8 +7698,8 @@
         </p:nvSpPr>
         <p:spPr>
           <a:xfrm>
-            <a:off x="227013" y="1006475"/>
-            <a:ext cx="4197350" cy="5119688"/>
+            <a:off x="1127448" y="1006475"/>
+            <a:ext cx="4820915" cy="5119688"/>
           </a:xfrm>
         </p:spPr>
         <p:txBody>
@@ -7705,7 +7712,7 @@
               </a:lnSpc>
             </a:pPr>
             <a:r>
-              <a:rPr lang="en-US" sz="2600">
+              <a:rPr lang="en-US" sz="2600" dirty="0">
                 <a:latin typeface="Calibri" charset="0"/>
                 <a:ea typeface="ＭＳ Ｐゴシック" charset="0"/>
               </a:rPr>
@@ -7719,7 +7726,7 @@
               </a:lnSpc>
             </a:pPr>
             <a:r>
-              <a:rPr lang="en-US" sz="2200">
+              <a:rPr lang="en-US" sz="2200" dirty="0">
                 <a:latin typeface="Calibri" charset="0"/>
                 <a:ea typeface="ＭＳ Ｐゴシック" charset="0"/>
               </a:rPr>
@@ -7733,7 +7740,7 @@
               </a:lnSpc>
             </a:pPr>
             <a:r>
-              <a:rPr lang="en-US" sz="1900">
+              <a:rPr lang="en-US" sz="1900" dirty="0">
                 <a:latin typeface="Calibri" charset="0"/>
                 <a:ea typeface="ＭＳ Ｐゴシック" charset="0"/>
               </a:rPr>
@@ -7747,7 +7754,7 @@
               </a:lnSpc>
             </a:pPr>
             <a:r>
-              <a:rPr lang="en-US" sz="2600">
+              <a:rPr lang="en-US" sz="2600" dirty="0">
                 <a:latin typeface="Calibri" charset="0"/>
                 <a:ea typeface="ＭＳ Ｐゴシック" charset="0"/>
               </a:rPr>
@@ -7761,7 +7768,7 @@
               </a:lnSpc>
             </a:pPr>
             <a:r>
-              <a:rPr lang="en-US" sz="2200">
+              <a:rPr lang="en-US" sz="2200" dirty="0">
                 <a:latin typeface="Calibri" charset="0"/>
                 <a:ea typeface="ＭＳ Ｐゴシック" charset="0"/>
               </a:rPr>
@@ -7775,7 +7782,7 @@
               </a:lnSpc>
             </a:pPr>
             <a:r>
-              <a:rPr lang="en-US" sz="2200">
+              <a:rPr lang="en-US" sz="2200" dirty="0">
                 <a:latin typeface="Calibri" charset="0"/>
                 <a:ea typeface="ＭＳ Ｐゴシック" charset="0"/>
               </a:rPr>
@@ -7789,7 +7796,7 @@
               </a:lnSpc>
             </a:pPr>
             <a:r>
-              <a:rPr lang="en-US" sz="1900">
+              <a:rPr lang="en-US" sz="1900" dirty="0">
                 <a:latin typeface="Calibri" charset="0"/>
                 <a:ea typeface="ＭＳ Ｐゴシック" charset="0"/>
               </a:rPr>
@@ -7803,7 +7810,7 @@
               </a:lnSpc>
             </a:pPr>
             <a:r>
-              <a:rPr lang="en-US" sz="2200">
+              <a:rPr lang="en-US" sz="2200" dirty="0">
                 <a:latin typeface="Calibri" charset="0"/>
                 <a:ea typeface="ＭＳ Ｐゴシック" charset="0"/>
               </a:rPr>
@@ -7816,7 +7823,7 @@
                 <a:spcPct val="90000"/>
               </a:lnSpc>
             </a:pPr>
-            <a:endParaRPr lang="en-US" sz="2200">
+            <a:endParaRPr lang="en-US" sz="2200" dirty="0">
               <a:latin typeface="Calibri" charset="0"/>
               <a:ea typeface="ＭＳ Ｐゴシック" charset="0"/>
             </a:endParaRPr>
@@ -7827,7 +7834,7 @@
                 <a:spcPct val="90000"/>
               </a:lnSpc>
             </a:pPr>
-            <a:endParaRPr lang="en-US" sz="2600">
+            <a:endParaRPr lang="en-US" sz="2600" dirty="0">
               <a:latin typeface="Calibri" charset="0"/>
               <a:ea typeface="ＭＳ Ｐゴシック" charset="0"/>
             </a:endParaRPr>
@@ -7857,7 +7864,7 @@
         </p:blipFill>
         <p:spPr bwMode="auto">
           <a:xfrm>
-            <a:off x="4648200" y="1006475"/>
+            <a:off x="6172201" y="1006475"/>
             <a:ext cx="4214813" cy="5119688"/>
           </a:xfrm>
           <a:prstGeom prst="rect">
@@ -7930,7 +7937,7 @@
         </p:nvSpPr>
         <p:spPr>
           <a:xfrm>
-            <a:off x="152400" y="115888"/>
+            <a:off x="1676400" y="115888"/>
             <a:ext cx="8839200" cy="1143000"/>
           </a:xfrm>
         </p:spPr>
@@ -7962,8 +7969,8 @@
         </p:nvSpPr>
         <p:spPr>
           <a:xfrm>
-            <a:off x="152400" y="1600200"/>
-            <a:ext cx="8839200" cy="4648200"/>
+            <a:off x="839416" y="1600200"/>
+            <a:ext cx="9676184" cy="4648200"/>
           </a:xfrm>
         </p:spPr>
         <p:txBody>
@@ -7971,7 +7978,7 @@
           <a:lstStyle/>
           <a:p>
             <a:r>
-              <a:rPr lang="en-US">
+              <a:rPr lang="en-US" dirty="0">
                 <a:latin typeface="Calibri" charset="0"/>
                 <a:ea typeface="ＭＳ Ｐゴシック" charset="0"/>
               </a:rPr>
@@ -7980,7 +7987,7 @@
           </a:p>
           <a:p>
             <a:r>
-              <a:rPr lang="en-US">
+              <a:rPr lang="en-US" dirty="0">
                 <a:latin typeface="Calibri" charset="0"/>
                 <a:ea typeface="ＭＳ Ｐゴシック" charset="0"/>
               </a:rPr>
@@ -7989,7 +7996,7 @@
           </a:p>
           <a:p>
             <a:r>
-              <a:rPr lang="en-US">
+              <a:rPr lang="en-US" dirty="0">
                 <a:latin typeface="Calibri" charset="0"/>
                 <a:ea typeface="ＭＳ Ｐゴシック" charset="0"/>
               </a:rPr>
@@ -7998,7 +8005,7 @@
           </a:p>
           <a:p>
             <a:r>
-              <a:rPr lang="en-US">
+              <a:rPr lang="en-US" dirty="0">
                 <a:latin typeface="Calibri" charset="0"/>
                 <a:ea typeface="ＭＳ Ｐゴシック" charset="0"/>
               </a:rPr>
@@ -8008,7 +8015,7 @@
           <a:p>
             <a:pPr lvl="1"/>
             <a:r>
-              <a:rPr lang="en-US">
+              <a:rPr lang="en-US" dirty="0">
                 <a:latin typeface="Calibri" charset="0"/>
                 <a:ea typeface="ＭＳ Ｐゴシック" charset="0"/>
               </a:rPr>
@@ -8017,7 +8024,7 @@
           </a:p>
           <a:p>
             <a:r>
-              <a:rPr lang="en-US">
+              <a:rPr lang="en-US" dirty="0">
                 <a:latin typeface="Calibri" charset="0"/>
                 <a:ea typeface="ＭＳ Ｐゴシック" charset="0"/>
               </a:rPr>
@@ -8026,7 +8033,7 @@
           </a:p>
           <a:p>
             <a:r>
-              <a:rPr lang="en-US">
+              <a:rPr lang="en-US" dirty="0">
                 <a:latin typeface="Calibri" charset="0"/>
                 <a:ea typeface="ＭＳ Ｐゴシック" charset="0"/>
               </a:rPr>
@@ -8035,7 +8042,7 @@
           </a:p>
           <a:p>
             <a:r>
-              <a:rPr lang="en-US">
+              <a:rPr lang="en-US" dirty="0">
                 <a:latin typeface="Calibri" charset="0"/>
                 <a:ea typeface="ＭＳ Ｐゴシック" charset="0"/>
               </a:rPr>
@@ -8086,7 +8093,7 @@
         </p:nvSpPr>
         <p:spPr>
           <a:xfrm>
-            <a:off x="152400" y="115888"/>
+            <a:off x="1676400" y="115888"/>
             <a:ext cx="8839200" cy="1143000"/>
           </a:xfrm>
         </p:spPr>
@@ -8118,8 +8125,8 @@
         </p:nvSpPr>
         <p:spPr>
           <a:xfrm>
-            <a:off x="152400" y="1301750"/>
-            <a:ext cx="8839200" cy="4648200"/>
+            <a:off x="911424" y="1301750"/>
+            <a:ext cx="9604176" cy="4648200"/>
           </a:xfrm>
         </p:spPr>
         <p:txBody>
@@ -8127,7 +8134,7 @@
           <a:lstStyle/>
           <a:p>
             <a:r>
-              <a:rPr lang="en-US" sz="2500">
+              <a:rPr lang="en-US" sz="2500" dirty="0">
                 <a:latin typeface="Calibri" charset="0"/>
                 <a:ea typeface="ＭＳ Ｐゴシック" charset="0"/>
               </a:rPr>
@@ -8140,7 +8147,7 @@
               <a:buAutoNum type="arabicPeriod"/>
             </a:pPr>
             <a:r>
-              <a:rPr lang="en-US" sz="2500">
+              <a:rPr lang="en-US" sz="2500" dirty="0">
                 <a:latin typeface="Calibri" charset="0"/>
                 <a:ea typeface="ＭＳ Ｐゴシック" charset="0"/>
               </a:rPr>
@@ -8153,7 +8160,7 @@
               <a:buAutoNum type="arabicPeriod"/>
             </a:pPr>
             <a:r>
-              <a:rPr lang="en-US" sz="2500">
+              <a:rPr lang="en-US" sz="2500" dirty="0">
                 <a:latin typeface="Calibri" charset="0"/>
                 <a:ea typeface="ＭＳ Ｐゴシック" charset="0"/>
               </a:rPr>
@@ -8166,7 +8173,7 @@
               <a:buAutoNum type="arabicPeriod"/>
             </a:pPr>
             <a:r>
-              <a:rPr lang="en-US" sz="2500">
+              <a:rPr lang="en-US" sz="2500" dirty="0">
                 <a:latin typeface="Calibri" charset="0"/>
                 <a:ea typeface="ＭＳ Ｐゴシック" charset="0"/>
               </a:rPr>
@@ -8179,7 +8186,7 @@
               <a:buChar char="•"/>
             </a:pPr>
             <a:r>
-              <a:rPr lang="en-US" sz="2100">
+              <a:rPr lang="en-US" sz="2100" dirty="0">
                 <a:latin typeface="Calibri" charset="0"/>
                 <a:ea typeface="ＭＳ Ｐゴシック" charset="0"/>
               </a:rPr>
@@ -8193,7 +8200,7 @@
               <a:t>‘</a:t>
             </a:r>
             <a:r>
-              <a:rPr lang="en-US" altLang="ja-JP" sz="2100">
+              <a:rPr lang="en-US" altLang="ja-JP" sz="2100" dirty="0">
                 <a:latin typeface="Calibri" charset="0"/>
                 <a:ea typeface="ＭＳ Ｐゴシック" charset="0"/>
               </a:rPr>
@@ -8207,7 +8214,7 @@
               <a:t>’</a:t>
             </a:r>
             <a:r>
-              <a:rPr lang="en-US" altLang="ja-JP" sz="2100">
+              <a:rPr lang="en-US" altLang="ja-JP" sz="2100" dirty="0">
                 <a:latin typeface="Calibri" charset="0"/>
                 <a:ea typeface="ＭＳ Ｐゴシック" charset="0"/>
               </a:rPr>
@@ -8221,7 +8228,7 @@
               <a:t>‘</a:t>
             </a:r>
             <a:r>
-              <a:rPr lang="en-US" altLang="ja-JP" sz="2100">
+              <a:rPr lang="en-US" altLang="ja-JP" sz="2100" dirty="0">
                 <a:latin typeface="Calibri" charset="0"/>
                 <a:ea typeface="ＭＳ Ｐゴシック" charset="0"/>
               </a:rPr>
@@ -8235,7 +8242,7 @@
               <a:t>’</a:t>
             </a:r>
             <a:r>
-              <a:rPr lang="en-US" altLang="ja-JP" sz="2100">
+              <a:rPr lang="en-US" altLang="ja-JP" sz="2100" dirty="0">
                 <a:latin typeface="Calibri" charset="0"/>
                 <a:ea typeface="ＭＳ Ｐゴシック" charset="0"/>
               </a:rPr>
@@ -8248,7 +8255,7 @@
               <a:buAutoNum type="arabicPeriod"/>
             </a:pPr>
             <a:r>
-              <a:rPr lang="en-US" sz="2500">
+              <a:rPr lang="en-US" sz="2500" dirty="0">
                 <a:latin typeface="Calibri" charset="0"/>
                 <a:ea typeface="ＭＳ Ｐゴシック" charset="0"/>
               </a:rPr>
@@ -8261,11 +8268,39 @@
               <a:buChar char="•"/>
             </a:pPr>
             <a:r>
-              <a:rPr lang="en-US" sz="2100">
-                <a:latin typeface="Calibri" charset="0"/>
-                <a:ea typeface="ＭＳ Ｐゴシック" charset="0"/>
-              </a:rPr>
-              <a:t>Import into downstream software (R, Matlab, Cytoscape, Ingenuity, etc.)</a:t>
+              <a:rPr lang="en-US" sz="2100" dirty="0">
+                <a:latin typeface="Calibri" charset="0"/>
+                <a:ea typeface="ＭＳ Ｐゴシック" charset="0"/>
+              </a:rPr>
+              <a:t>Import into downstream software (R, </a:t>
+            </a:r>
+            <a:r>
+              <a:rPr lang="en-US" sz="2100" dirty="0" err="1">
+                <a:latin typeface="Calibri" charset="0"/>
+                <a:ea typeface="ＭＳ Ｐゴシック" charset="0"/>
+              </a:rPr>
+              <a:t>Matlab</a:t>
+            </a:r>
+            <a:r>
+              <a:rPr lang="en-US" sz="2100" dirty="0">
+                <a:latin typeface="Calibri" charset="0"/>
+                <a:ea typeface="ＭＳ Ｐゴシック" charset="0"/>
+              </a:rPr>
+              <a:t>, </a:t>
+            </a:r>
+            <a:r>
+              <a:rPr lang="en-US" sz="2100" dirty="0" err="1">
+                <a:latin typeface="Calibri" charset="0"/>
+                <a:ea typeface="ＭＳ Ｐゴシック" charset="0"/>
+              </a:rPr>
+              <a:t>Cytoscape</a:t>
+            </a:r>
+            <a:r>
+              <a:rPr lang="en-US" sz="2100" dirty="0">
+                <a:latin typeface="Calibri" charset="0"/>
+                <a:ea typeface="ＭＳ Ｐゴシック" charset="0"/>
+              </a:rPr>
+              <a:t>, Ingenuity, etc.)</a:t>
             </a:r>
           </a:p>
           <a:p>
@@ -8274,7 +8309,7 @@
               <a:buAutoNum type="arabicPeriod"/>
             </a:pPr>
             <a:r>
-              <a:rPr lang="en-US" sz="2500">
+              <a:rPr lang="en-US" sz="2500" dirty="0">
                 <a:latin typeface="Calibri" charset="0"/>
                 <a:ea typeface="ＭＳ Ｐゴシック" charset="0"/>
               </a:rPr>
@@ -8287,7 +8322,7 @@
               <a:buChar char="•"/>
             </a:pPr>
             <a:r>
-              <a:rPr lang="en-US" sz="2100">
+              <a:rPr lang="en-US" sz="2100" dirty="0">
                 <a:latin typeface="Calibri" charset="0"/>
                 <a:ea typeface="ＭＳ Ｐゴシック" charset="0"/>
               </a:rPr>
@@ -8338,7 +8373,7 @@
         </p:nvSpPr>
         <p:spPr>
           <a:xfrm>
-            <a:off x="152400" y="0"/>
+            <a:off x="1676400" y="0"/>
             <a:ext cx="8839200" cy="1143000"/>
           </a:xfrm>
         </p:spPr>
@@ -8368,8 +8403,8 @@
         </p:nvSpPr>
         <p:spPr>
           <a:xfrm>
-            <a:off x="152400" y="1066800"/>
-            <a:ext cx="8839200" cy="5105400"/>
+            <a:off x="695400" y="1066800"/>
+            <a:ext cx="10657184" cy="5105400"/>
           </a:xfrm>
         </p:spPr>
         <p:txBody>
@@ -8377,24 +8412,38 @@
           <a:lstStyle/>
           <a:p>
             <a:r>
-              <a:rPr lang="en-US">
-                <a:latin typeface="Calibri" charset="0"/>
-                <a:ea typeface="ＭＳ Ｐゴシック" charset="0"/>
-              </a:rPr>
-              <a:t>Go to the BioStar website:</a:t>
+              <a:rPr lang="en-US" dirty="0">
+                <a:latin typeface="Calibri" charset="0"/>
+                <a:ea typeface="ＭＳ Ｐゴシック" charset="0"/>
+              </a:rPr>
+              <a:t>Go to the </a:t>
+            </a:r>
+            <a:r>
+              <a:rPr lang="en-US" dirty="0" err="1">
+                <a:latin typeface="Calibri" charset="0"/>
+                <a:ea typeface="ＭＳ Ｐゴシック" charset="0"/>
+              </a:rPr>
+              <a:t>BioStar</a:t>
+            </a:r>
+            <a:r>
+              <a:rPr lang="en-US" dirty="0">
+                <a:latin typeface="Calibri" charset="0"/>
+                <a:ea typeface="ＭＳ Ｐゴシック" charset="0"/>
+              </a:rPr>
+              <a:t> website:</a:t>
             </a:r>
           </a:p>
           <a:p>
             <a:pPr lvl="1"/>
             <a:r>
-              <a:rPr lang="en-US">
+              <a:rPr lang="en-US" dirty="0">
                 <a:latin typeface="Calibri" charset="0"/>
                 <a:ea typeface="ＭＳ Ｐゴシック" charset="0"/>
                 <a:hlinkClick r:id="rId2"/>
               </a:rPr>
               <a:t>http://www.biostars.org/</a:t>
             </a:r>
-            <a:endParaRPr lang="en-US">
+            <a:endParaRPr lang="en-US" dirty="0">
               <a:latin typeface="Calibri" charset="0"/>
               <a:ea typeface="ＭＳ Ｐゴシック" charset="0"/>
             </a:endParaRPr>
@@ -8402,7 +8451,7 @@
           <a:p>
             <a:pPr lvl="1"/>
             <a:r>
-              <a:rPr lang="en-US">
+              <a:rPr lang="en-US" dirty="0">
                 <a:latin typeface="Calibri" charset="0"/>
                 <a:ea typeface="ＭＳ Ｐゴシック" charset="0"/>
               </a:rPr>
@@ -8412,7 +8461,7 @@
           <a:p>
             <a:pPr lvl="1"/>
             <a:r>
-              <a:rPr lang="en-US">
+              <a:rPr lang="en-US" dirty="0">
                 <a:latin typeface="Calibri" charset="0"/>
                 <a:ea typeface="ＭＳ Ｐゴシック" charset="0"/>
               </a:rPr>
@@ -8426,7 +8475,7 @@
               <a:t>‘</a:t>
             </a:r>
             <a:r>
-              <a:rPr lang="en-US" altLang="ja-JP">
+              <a:rPr lang="en-US" altLang="ja-JP" dirty="0">
                 <a:latin typeface="Calibri" charset="0"/>
                 <a:ea typeface="ＭＳ Ｐゴシック" charset="0"/>
               </a:rPr>
@@ -8439,14 +8488,14 @@
               </a:rPr>
               <a:t>’</a:t>
             </a:r>
-            <a:endParaRPr lang="en-US" altLang="ja-JP">
+            <a:endParaRPr lang="en-US" altLang="ja-JP" dirty="0">
               <a:latin typeface="Calibri" charset="0"/>
               <a:ea typeface="ＭＳ Ｐゴシック" charset="0"/>
             </a:endParaRPr>
           </a:p>
           <a:p>
             <a:r>
-              <a:rPr lang="en-US">
+              <a:rPr lang="en-US" dirty="0">
                 <a:latin typeface="Calibri" charset="0"/>
                 <a:ea typeface="ＭＳ Ｐゴシック" charset="0"/>
               </a:rPr>
@@ -8455,7 +8504,7 @@
           </a:p>
           <a:p>
             <a:r>
-              <a:rPr lang="en-US">
+              <a:rPr lang="en-US" dirty="0">
                 <a:latin typeface="Calibri" charset="0"/>
                 <a:ea typeface="ＭＳ Ｐゴシック" charset="0"/>
               </a:rPr>
@@ -8465,7 +8514,7 @@
           <a:p>
             <a:pPr lvl="1"/>
             <a:r>
-              <a:rPr lang="en-US">
+              <a:rPr lang="en-US" dirty="0">
                 <a:latin typeface="Calibri" charset="0"/>
                 <a:ea typeface="ＭＳ Ｐゴシック" charset="0"/>
               </a:rPr>
@@ -8479,7 +8528,7 @@
               <a:t>‘</a:t>
             </a:r>
             <a:r>
-              <a:rPr lang="en-US" altLang="ja-JP">
+              <a:rPr lang="en-US" altLang="ja-JP" dirty="0">
                 <a:latin typeface="Calibri" charset="0"/>
                 <a:ea typeface="ＭＳ Ｐゴシック" charset="0"/>
               </a:rPr>
@@ -8492,7 +8541,7 @@
               </a:rPr>
               <a:t>’</a:t>
             </a:r>
-            <a:endParaRPr lang="en-US" altLang="ja-JP">
+            <a:endParaRPr lang="en-US" altLang="ja-JP" dirty="0">
               <a:latin typeface="Calibri" charset="0"/>
               <a:ea typeface="ＭＳ Ｐゴシック" charset="0"/>
             </a:endParaRPr>
@@ -8500,7 +8549,7 @@
           <a:p>
             <a:pPr lvl="1"/>
             <a:r>
-              <a:rPr lang="en-US">
+              <a:rPr lang="en-US" dirty="0">
                 <a:latin typeface="Calibri" charset="0"/>
                 <a:ea typeface="ＭＳ Ｐゴシック" charset="0"/>
               </a:rPr>
@@ -8510,7 +8559,7 @@
           <a:p>
             <a:pPr lvl="1"/>
             <a:r>
-              <a:rPr lang="en-US">
+              <a:rPr lang="en-US" dirty="0">
                 <a:latin typeface="Calibri" charset="0"/>
                 <a:ea typeface="ＭＳ Ｐゴシック" charset="0"/>
               </a:rPr>
@@ -8561,7 +8610,7 @@
         </p:nvSpPr>
         <p:spPr>
           <a:xfrm>
-            <a:off x="152400" y="115888"/>
+            <a:off x="1676400" y="115888"/>
             <a:ext cx="8839200" cy="1143000"/>
           </a:xfrm>
         </p:spPr>
@@ -8593,8 +8642,8 @@
         </p:nvSpPr>
         <p:spPr>
           <a:xfrm>
-            <a:off x="152400" y="1905000"/>
-            <a:ext cx="8839200" cy="3962400"/>
+            <a:off x="911424" y="1905000"/>
+            <a:ext cx="10585176" cy="3962400"/>
           </a:xfrm>
         </p:spPr>
         <p:txBody>
@@ -8750,7 +8799,7 @@
         </p:nvSpPr>
         <p:spPr>
           <a:xfrm>
-            <a:off x="152400" y="-26988"/>
+            <a:off x="1676400" y="-26988"/>
             <a:ext cx="8839200" cy="1143001"/>
           </a:xfrm>
         </p:spPr>
@@ -8780,13 +8829,13 @@
         </p:nvSpPr>
         <p:spPr>
           <a:xfrm>
-            <a:off x="152400" y="1584920"/>
-            <a:ext cx="8839200" cy="4724400"/>
+            <a:off x="551384" y="1116013"/>
+            <a:ext cx="10873208" cy="5193307"/>
           </a:xfrm>
         </p:spPr>
         <p:txBody>
           <a:bodyPr>
-            <a:normAutofit fontScale="92500" lnSpcReduction="10000"/>
+            <a:normAutofit/>
           </a:bodyPr>
           <a:lstStyle/>
           <a:p>
@@ -8836,7 +8885,6 @@
           </a:p>
           <a:p>
             <a:pPr marL="0" indent="0">
-              <a:buFont typeface="Arial" charset="0"/>
               <a:buNone/>
               <a:defRPr/>
             </a:pPr>
@@ -8973,7 +9021,7 @@
         </p:nvSpPr>
         <p:spPr>
           <a:xfrm>
-            <a:off x="152400" y="115888"/>
+            <a:off x="1676400" y="115888"/>
             <a:ext cx="8839200" cy="1143000"/>
           </a:xfrm>
         </p:spPr>
@@ -9005,8 +9053,8 @@
         </p:nvSpPr>
         <p:spPr>
           <a:xfrm>
-            <a:off x="152400" y="1600200"/>
-            <a:ext cx="8839200" cy="4648200"/>
+            <a:off x="623392" y="1600200"/>
+            <a:ext cx="10873208" cy="4648200"/>
           </a:xfrm>
         </p:spPr>
         <p:txBody>
@@ -9019,7 +9067,7 @@
               </a:lnSpc>
             </a:pPr>
             <a:r>
-              <a:rPr lang="en-US" sz="2600">
+              <a:rPr lang="en-US" sz="2600" dirty="0">
                 <a:latin typeface="Calibri" charset="0"/>
                 <a:ea typeface="ＭＳ Ｐゴシック" charset="0"/>
               </a:rPr>
@@ -9033,7 +9081,7 @@
               </a:lnSpc>
             </a:pPr>
             <a:r>
-              <a:rPr lang="en-US" sz="2200">
+              <a:rPr lang="en-US" sz="2200" dirty="0">
                 <a:latin typeface="Calibri" charset="0"/>
                 <a:ea typeface="ＭＳ Ｐゴシック" charset="0"/>
               </a:rPr>
@@ -9047,7 +9095,7 @@
               </a:lnSpc>
             </a:pPr>
             <a:r>
-              <a:rPr lang="en-US" sz="2200">
+              <a:rPr lang="en-US" sz="2200" dirty="0">
                 <a:latin typeface="Calibri" charset="0"/>
                 <a:ea typeface="ＭＳ Ｐゴシック" charset="0"/>
               </a:rPr>
@@ -9061,7 +9109,7 @@
               </a:lnSpc>
             </a:pPr>
             <a:r>
-              <a:rPr lang="en-US" sz="2200">
+              <a:rPr lang="en-US" sz="2200" dirty="0">
                 <a:latin typeface="Calibri" charset="0"/>
                 <a:ea typeface="ＭＳ Ｐゴシック" charset="0"/>
               </a:rPr>
@@ -9075,7 +9123,7 @@
               </a:lnSpc>
             </a:pPr>
             <a:r>
-              <a:rPr lang="en-US" sz="2200">
+              <a:rPr lang="en-US" sz="2200" dirty="0">
                 <a:latin typeface="Calibri" charset="0"/>
                 <a:ea typeface="ＭＳ Ｐゴシック" charset="0"/>
               </a:rPr>
@@ -9089,7 +9137,7 @@
               </a:lnSpc>
             </a:pPr>
             <a:r>
-              <a:rPr lang="en-US" sz="2600">
+              <a:rPr lang="en-US" sz="2600" dirty="0">
                 <a:latin typeface="Calibri" charset="0"/>
                 <a:ea typeface="ＭＳ Ｐゴシック" charset="0"/>
               </a:rPr>
@@ -9103,7 +9151,7 @@
               </a:lnSpc>
             </a:pPr>
             <a:r>
-              <a:rPr lang="en-US" sz="2600">
+              <a:rPr lang="en-US" sz="2600" dirty="0">
                 <a:latin typeface="Calibri" charset="0"/>
                 <a:ea typeface="ＭＳ Ｐゴシック" charset="0"/>
               </a:rPr>
@@ -9117,11 +9165,25 @@
               </a:lnSpc>
             </a:pPr>
             <a:r>
-              <a:rPr lang="en-US" sz="2600">
-                <a:latin typeface="Calibri" charset="0"/>
-                <a:ea typeface="ＭＳ Ｐゴシック" charset="0"/>
-              </a:rPr>
-              <a:t>Good news:  1-2 lanes of recent Illumina HiSeq data should be enough for most purposes</a:t>
+              <a:rPr lang="en-US" sz="2600" dirty="0">
+                <a:latin typeface="Calibri" charset="0"/>
+                <a:ea typeface="ＭＳ Ｐゴシック" charset="0"/>
+              </a:rPr>
+              <a:t>Good news:  1-2 lanes of recent Illumina </a:t>
+            </a:r>
+            <a:r>
+              <a:rPr lang="en-US" sz="2600" dirty="0" err="1">
+                <a:latin typeface="Calibri" charset="0"/>
+                <a:ea typeface="ＭＳ Ｐゴシック" charset="0"/>
+              </a:rPr>
+              <a:t>HiSeq</a:t>
+            </a:r>
+            <a:r>
+              <a:rPr lang="en-US" sz="2600" dirty="0">
+                <a:latin typeface="Calibri" charset="0"/>
+                <a:ea typeface="ＭＳ Ｐゴシック" charset="0"/>
+              </a:rPr>
+              <a:t> data should be enough for most purposes</a:t>
             </a:r>
           </a:p>
         </p:txBody>
@@ -9168,7 +9230,7 @@
         </p:nvSpPr>
         <p:spPr>
           <a:xfrm>
-            <a:off x="152400" y="115888"/>
+            <a:off x="1676400" y="115888"/>
             <a:ext cx="8839200" cy="1143000"/>
           </a:xfrm>
         </p:spPr>
@@ -9200,8 +9262,8 @@
         </p:nvSpPr>
         <p:spPr>
           <a:xfrm>
-            <a:off x="152400" y="1600200"/>
-            <a:ext cx="8839200" cy="4648200"/>
+            <a:off x="551384" y="1600200"/>
+            <a:ext cx="10873208" cy="4648200"/>
           </a:xfrm>
         </p:spPr>
         <p:txBody>
@@ -9384,7 +9446,7 @@
         </p:nvSpPr>
         <p:spPr>
           <a:xfrm>
-            <a:off x="152400" y="-26988"/>
+            <a:off x="1676400" y="-26988"/>
             <a:ext cx="8839200" cy="1143001"/>
           </a:xfrm>
         </p:spPr>
@@ -9415,7 +9477,7 @@
         <p:spPr/>
         <p:txBody>
           <a:bodyPr>
-            <a:normAutofit fontScale="92500" lnSpcReduction="10000"/>
+            <a:normAutofit lnSpcReduction="10000"/>
           </a:bodyPr>
           <a:lstStyle/>
           <a:p>
@@ -9538,7 +9600,7 @@
         </p:nvSpPr>
         <p:spPr>
           <a:xfrm>
-            <a:off x="152400" y="-27384"/>
+            <a:off x="1676400" y="-27384"/>
             <a:ext cx="8839200" cy="1143000"/>
           </a:xfrm>
         </p:spPr>
@@ -9639,7 +9701,7 @@
         </p:nvSpPr>
         <p:spPr>
           <a:xfrm>
-            <a:off x="152400" y="2667000"/>
+            <a:off x="1676400" y="2667000"/>
             <a:ext cx="8839200" cy="1600200"/>
           </a:xfrm>
         </p:spPr>
@@ -9716,7 +9778,7 @@
         </p:nvSpPr>
         <p:spPr>
           <a:xfrm>
-            <a:off x="152400" y="0"/>
+            <a:off x="1676400" y="0"/>
             <a:ext cx="8839200" cy="1143000"/>
           </a:xfrm>
         </p:spPr>
@@ -9797,7 +9859,7 @@
         </p:blipFill>
         <p:spPr>
           <a:xfrm>
-            <a:off x="180628" y="1628800"/>
+            <a:off x="1704628" y="1628800"/>
             <a:ext cx="8783860" cy="3996688"/>
           </a:xfrm>
           <a:prstGeom prst="rect">
@@ -9815,7 +9877,7 @@
         </p:nvSpPr>
         <p:spPr bwMode="auto">
           <a:xfrm>
-            <a:off x="2267744" y="5538788"/>
+            <a:off x="3791744" y="5538788"/>
             <a:ext cx="1073832" cy="338554"/>
           </a:xfrm>
           <a:prstGeom prst="rect">
@@ -10008,7 +10070,7 @@
         </p:nvSpPr>
         <p:spPr>
           <a:xfrm>
-            <a:off x="152400" y="2667000"/>
+            <a:off x="1676400" y="2667000"/>
             <a:ext cx="8839200" cy="1600200"/>
           </a:xfrm>
         </p:spPr>
@@ -10072,7 +10134,7 @@
         </p:nvSpPr>
         <p:spPr>
           <a:xfrm>
-            <a:off x="152400" y="115888"/>
+            <a:off x="1676400" y="115888"/>
             <a:ext cx="8839200" cy="1143000"/>
           </a:xfrm>
         </p:spPr>
@@ -10217,7 +10279,7 @@
         </p:nvSpPr>
         <p:spPr>
           <a:xfrm>
-            <a:off x="152400" y="269875"/>
+            <a:off x="1676401" y="269875"/>
             <a:ext cx="3051175" cy="1143000"/>
           </a:xfrm>
         </p:spPr>
@@ -10259,7 +10321,7 @@
         </p:blipFill>
         <p:spPr>
           <a:xfrm>
-            <a:off x="3635896" y="116632"/>
+            <a:off x="5159896" y="116633"/>
             <a:ext cx="4890740" cy="6115475"/>
           </a:xfrm>
           <a:prstGeom prst="rect">
@@ -10309,7 +10371,7 @@
         </p:nvSpPr>
         <p:spPr>
           <a:xfrm>
-            <a:off x="152400" y="44450"/>
+            <a:off x="1676400" y="44450"/>
             <a:ext cx="8839200" cy="1143000"/>
           </a:xfrm>
         </p:spPr>
@@ -10351,7 +10413,7 @@
         </p:blipFill>
         <p:spPr>
           <a:xfrm>
-            <a:off x="395536" y="1124744"/>
+            <a:off x="1919537" y="1124744"/>
             <a:ext cx="8300547" cy="4824536"/>
           </a:xfrm>
           <a:prstGeom prst="rect">
@@ -10401,7 +10463,7 @@
         </p:nvSpPr>
         <p:spPr>
           <a:xfrm>
-            <a:off x="152400" y="44450"/>
+            <a:off x="1676400" y="44450"/>
             <a:ext cx="8839200" cy="1143000"/>
           </a:xfrm>
         </p:spPr>
@@ -10433,8 +10495,8 @@
         </p:nvSpPr>
         <p:spPr>
           <a:xfrm>
-            <a:off x="152400" y="1341438"/>
-            <a:ext cx="8839200" cy="4906962"/>
+            <a:off x="551384" y="1187450"/>
+            <a:ext cx="11233248" cy="5060950"/>
           </a:xfrm>
         </p:spPr>
         <p:txBody>
@@ -10561,7 +10623,7 @@
         </p:nvSpPr>
         <p:spPr>
           <a:xfrm>
-            <a:off x="152400" y="44450"/>
+            <a:off x="1676400" y="44450"/>
             <a:ext cx="8839200" cy="1143000"/>
           </a:xfrm>
         </p:spPr>
@@ -10593,8 +10655,8 @@
         </p:nvSpPr>
         <p:spPr>
           <a:xfrm>
-            <a:off x="152400" y="1341438"/>
-            <a:ext cx="8839200" cy="4906962"/>
+            <a:off x="551384" y="1341438"/>
+            <a:ext cx="10873208" cy="4906962"/>
           </a:xfrm>
         </p:spPr>
         <p:txBody>
@@ -10646,7 +10708,22 @@
                 <a:latin typeface="Calibri" charset="0"/>
                 <a:ea typeface="ＭＳ Ｐゴシック" charset="0"/>
               </a:rPr>
-              <a:t> mutations that affect what mRNA isoform is expressed and how much </a:t>
+              <a:t> mutations that affect what mRNA isoform is expressed and how much</a:t>
+            </a:r>
+          </a:p>
+          <a:p>
+            <a:pPr marL="457200" lvl="1" indent="0">
+              <a:lnSpc>
+                <a:spcPct val="90000"/>
+              </a:lnSpc>
+              <a:buNone/>
+            </a:pPr>
+            <a:r>
+              <a:rPr lang="en-US" altLang="ja-JP" sz="2200" dirty="0">
+                <a:latin typeface="Calibri" charset="0"/>
+                <a:ea typeface="ＭＳ Ｐゴシック" charset="0"/>
+              </a:rPr>
+              <a:t> </a:t>
             </a:r>
           </a:p>
           <a:p>
@@ -10763,7 +10840,7 @@
         </p:nvSpPr>
         <p:spPr>
           <a:xfrm>
-            <a:off x="152400" y="-76200"/>
+            <a:off x="1676400" y="-76200"/>
             <a:ext cx="8839200" cy="1143000"/>
           </a:xfrm>
         </p:spPr>
@@ -10795,8 +10872,8 @@
         </p:nvSpPr>
         <p:spPr>
           <a:xfrm>
-            <a:off x="152400" y="838200"/>
-            <a:ext cx="8839200" cy="4708525"/>
+            <a:off x="623392" y="838201"/>
+            <a:ext cx="10945216" cy="4708525"/>
           </a:xfrm>
         </p:spPr>
         <p:txBody>
@@ -10809,7 +10886,7 @@
               </a:lnSpc>
             </a:pPr>
             <a:r>
-              <a:rPr lang="en-US" sz="2600">
+              <a:rPr lang="en-US" sz="2600" dirty="0">
                 <a:latin typeface="Calibri" charset="0"/>
                 <a:ea typeface="ＭＳ Ｐゴシック" charset="0"/>
               </a:rPr>
@@ -10823,7 +10900,7 @@
               </a:lnSpc>
             </a:pPr>
             <a:r>
-              <a:rPr lang="en-US" sz="2200">
+              <a:rPr lang="en-US" sz="2200" dirty="0">
                 <a:latin typeface="Calibri" charset="0"/>
                 <a:ea typeface="ＭＳ Ｐゴシック" charset="0"/>
               </a:rPr>
@@ -10837,7 +10914,7 @@
               </a:lnSpc>
             </a:pPr>
             <a:r>
-              <a:rPr lang="en-US" sz="2600">
+              <a:rPr lang="en-US" sz="2600" dirty="0">
                 <a:latin typeface="Calibri" charset="0"/>
                 <a:ea typeface="ＭＳ Ｐゴシック" charset="0"/>
               </a:rPr>
@@ -10851,7 +10928,7 @@
               </a:lnSpc>
             </a:pPr>
             <a:r>
-              <a:rPr lang="en-US" sz="2200">
+              <a:rPr lang="en-US" sz="2200" dirty="0">
                 <a:latin typeface="Calibri" charset="0"/>
                 <a:ea typeface="ＭＳ Ｐゴシック" charset="0"/>
               </a:rPr>
@@ -10865,7 +10942,7 @@
               </a:lnSpc>
             </a:pPr>
             <a:r>
-              <a:rPr lang="en-US" sz="2600">
+              <a:rPr lang="en-US" sz="2600" dirty="0">
                 <a:latin typeface="Calibri" charset="0"/>
                 <a:ea typeface="ＭＳ Ｐゴシック" charset="0"/>
               </a:rPr>
@@ -10879,35 +10956,35 @@
               </a:lnSpc>
             </a:pPr>
             <a:r>
-              <a:rPr lang="en-US" sz="2200">
+              <a:rPr lang="en-US" sz="2200" dirty="0">
                 <a:latin typeface="Calibri" charset="0"/>
                 <a:ea typeface="ＭＳ Ｐゴシック" charset="0"/>
               </a:rPr>
               <a:t>10</a:t>
             </a:r>
             <a:r>
-              <a:rPr lang="en-US" sz="2200" baseline="30000">
+              <a:rPr lang="en-US" sz="2200" baseline="30000" dirty="0">
                 <a:latin typeface="Calibri" charset="0"/>
                 <a:ea typeface="ＭＳ Ｐゴシック" charset="0"/>
               </a:rPr>
               <a:t>5</a:t>
             </a:r>
             <a:r>
-              <a:rPr lang="en-US" sz="2200">
+              <a:rPr lang="en-US" sz="2200" dirty="0">
                 <a:latin typeface="Calibri" charset="0"/>
                 <a:ea typeface="ＭＳ Ｐゴシック" charset="0"/>
               </a:rPr>
               <a:t> – 10</a:t>
             </a:r>
             <a:r>
-              <a:rPr lang="en-US" sz="2200" baseline="30000">
+              <a:rPr lang="en-US" sz="2200" baseline="30000" dirty="0">
                 <a:latin typeface="Calibri" charset="0"/>
                 <a:ea typeface="ＭＳ Ｐゴシック" charset="0"/>
               </a:rPr>
               <a:t>7</a:t>
             </a:r>
             <a:r>
-              <a:rPr lang="en-US" sz="2200">
+              <a:rPr lang="en-US" sz="2200" dirty="0">
                 <a:latin typeface="Calibri" charset="0"/>
                 <a:ea typeface="ＭＳ Ｐゴシック" charset="0"/>
               </a:rPr>
@@ -10921,7 +10998,7 @@
               </a:lnSpc>
             </a:pPr>
             <a:r>
-              <a:rPr lang="en-US" sz="2200">
+              <a:rPr lang="en-US" sz="2200" dirty="0">
                 <a:latin typeface="Calibri" charset="0"/>
                 <a:ea typeface="ＭＳ Ｐゴシック" charset="0"/>
               </a:rPr>
@@ -10935,7 +11012,7 @@
               </a:lnSpc>
             </a:pPr>
             <a:r>
-              <a:rPr lang="en-US" sz="2200">
+              <a:rPr lang="en-US" sz="2200" dirty="0">
                 <a:latin typeface="Calibri" charset="0"/>
                 <a:ea typeface="ＭＳ Ｐゴシック" charset="0"/>
               </a:rPr>
@@ -10949,7 +11026,7 @@
               </a:lnSpc>
             </a:pPr>
             <a:r>
-              <a:rPr lang="en-US" sz="2600">
+              <a:rPr lang="en-US" sz="2600" dirty="0">
                 <a:latin typeface="Calibri" charset="0"/>
                 <a:ea typeface="ＭＳ Ｐゴシック" charset="0"/>
               </a:rPr>
@@ -10963,7 +11040,7 @@
               </a:lnSpc>
             </a:pPr>
             <a:r>
-              <a:rPr lang="en-US" sz="2200">
+              <a:rPr lang="en-US" sz="2200" dirty="0">
                 <a:latin typeface="Calibri" charset="0"/>
                 <a:ea typeface="ＭＳ Ｐゴシック" charset="0"/>
               </a:rPr>
@@ -10977,11 +11054,18 @@
               </a:lnSpc>
             </a:pPr>
             <a:r>
-              <a:rPr lang="en-US" sz="2200">
-                <a:latin typeface="Calibri" charset="0"/>
-                <a:ea typeface="ＭＳ Ｐゴシック" charset="0"/>
-              </a:rPr>
-              <a:t>PolyA selection of large RNAs may result in 3</a:t>
+              <a:rPr lang="en-US" sz="2200" dirty="0" err="1">
+                <a:latin typeface="Calibri" charset="0"/>
+                <a:ea typeface="ＭＳ Ｐゴシック" charset="0"/>
+              </a:rPr>
+              <a:t>PolyA</a:t>
+            </a:r>
+            <a:r>
+              <a:rPr lang="en-US" sz="2200" dirty="0">
+                <a:latin typeface="Calibri" charset="0"/>
+                <a:ea typeface="ＭＳ Ｐゴシック" charset="0"/>
+              </a:rPr>
+              <a:t> selection of large RNAs may result in 3</a:t>
             </a:r>
             <a:r>
               <a:rPr lang="ja-JP" altLang="en-US" sz="2200">
@@ -10991,7 +11075,7 @@
               <a:t>’</a:t>
             </a:r>
             <a:r>
-              <a:rPr lang="en-US" altLang="ja-JP" sz="2200">
+              <a:rPr lang="en-US" altLang="ja-JP" sz="2200" dirty="0">
                 <a:latin typeface="Calibri" charset="0"/>
                 <a:ea typeface="ＭＳ Ｐゴシック" charset="0"/>
               </a:rPr>
@@ -11005,7 +11089,7 @@
               </a:lnSpc>
             </a:pPr>
             <a:r>
-              <a:rPr lang="en-US" sz="2600">
+              <a:rPr lang="en-US" sz="2600" dirty="0">
                 <a:latin typeface="Calibri" charset="0"/>
                 <a:ea typeface="ＭＳ Ｐゴシック" charset="0"/>
               </a:rPr>
@@ -11018,7 +11102,7 @@
                 <a:spcPct val="90000"/>
               </a:lnSpc>
             </a:pPr>
-            <a:endParaRPr lang="en-US" sz="2600">
+            <a:endParaRPr lang="en-US" sz="2600" dirty="0">
               <a:latin typeface="Calibri" charset="0"/>
               <a:ea typeface="ＭＳ Ｐゴシック" charset="0"/>
             </a:endParaRPr>
@@ -11067,7 +11151,7 @@
         </p:nvSpPr>
         <p:spPr>
           <a:xfrm>
-            <a:off x="152400" y="76200"/>
+            <a:off x="1676400" y="76200"/>
             <a:ext cx="8839200" cy="1143000"/>
           </a:xfrm>
         </p:spPr>
@@ -11097,7 +11181,7 @@
         </p:nvSpPr>
         <p:spPr>
           <a:xfrm>
-            <a:off x="152400" y="1600200"/>
+            <a:off x="1676400" y="1600200"/>
             <a:ext cx="8839200" cy="1676400"/>
           </a:xfrm>
         </p:spPr>
@@ -11192,7 +11276,7 @@
         </p:blipFill>
         <p:spPr bwMode="auto">
           <a:xfrm>
-            <a:off x="4724400" y="3581400"/>
+            <a:off x="6248400" y="3581400"/>
             <a:ext cx="3886200" cy="2025650"/>
           </a:xfrm>
           <a:prstGeom prst="rect">
@@ -11246,7 +11330,7 @@
         </p:blipFill>
         <p:spPr bwMode="auto">
           <a:xfrm>
-            <a:off x="361950" y="3505200"/>
+            <a:off x="1885950" y="3505201"/>
             <a:ext cx="3981450" cy="2074863"/>
           </a:xfrm>
           <a:prstGeom prst="rect">
@@ -11287,7 +11371,7 @@
         </p:nvSpPr>
         <p:spPr bwMode="auto">
           <a:xfrm>
-            <a:off x="1477963" y="5486400"/>
+            <a:off x="3001964" y="5486401"/>
             <a:ext cx="1493837" cy="461963"/>
           </a:xfrm>
           <a:prstGeom prst="rect">
@@ -11448,7 +11532,7 @@
         </p:nvSpPr>
         <p:spPr bwMode="auto">
           <a:xfrm>
-            <a:off x="5973763" y="5486400"/>
+            <a:off x="7497763" y="5486401"/>
             <a:ext cx="1408112" cy="461963"/>
           </a:xfrm>
           <a:prstGeom prst="rect">

</xml_diff>